<commit_message>
fixed numbering, cleaned up style a little, added to presentation
</commit_message>
<xml_diff>
--- a/workshop2/presentation.pptx
+++ b/workshop2/presentation.pptx
@@ -6892,10 +6892,11 @@
             </a:r>
           </a:p>
           <a:p>
-            <a:pPr marL="45720" indent="0">
-              <a:buNone/>
-            </a:pPr>
-            <a:endParaRPr lang="en-US" sz="3000" dirty="0"/>
+            <a:pPr lvl="1"/>
+            <a:r>
+              <a:rPr lang="en-US" sz="2800" dirty="0"/>
+              <a:t>And use Angular Material </a:t>
+            </a:r>
           </a:p>
           <a:p>
             <a:pPr marL="45720" indent="0">

</xml_diff>

<commit_message>
added transistions to complicated slides for better understanding
</commit_message>
<xml_diff>
--- a/workshop2/presentation.pptx
+++ b/workshop2/presentation.pptx
@@ -229,7 +229,7 @@
           <a:p>
             <a:fld id="{20EA5F0D-C1DC-412F-A146-DDB3A74B588F}" type="datetimeFigureOut">
               <a:rPr lang="en-US"/>
-              <a:t>2/29/2016</a:t>
+              <a:t>3/1/2016</a:t>
             </a:fld>
             <a:endParaRPr/>
           </a:p>
@@ -394,7 +394,7 @@
           <a:p>
             <a:fld id="{A8CDE508-72C8-4AB5-AA9C-1584D31690E0}" type="datetimeFigureOut">
               <a:rPr lang="en-US"/>
-              <a:t>2/29/2016</a:t>
+              <a:t>3/1/2016</a:t>
             </a:fld>
             <a:endParaRPr/>
           </a:p>
@@ -1004,7 +1004,7 @@
           <a:p>
             <a:fld id="{9E583DDF-CA54-461A-A486-592D2374C532}" type="datetimeFigureOut">
               <a:rPr lang="en-US"/>
-              <a:t>2/29/2016</a:t>
+              <a:t>3/1/2016</a:t>
             </a:fld>
             <a:endParaRPr/>
           </a:p>
@@ -1196,7 +1196,7 @@
           <a:p>
             <a:fld id="{9E583DDF-CA54-461A-A486-592D2374C532}" type="datetimeFigureOut">
               <a:rPr lang="en-US"/>
-              <a:t>2/29/2016</a:t>
+              <a:t>3/1/2016</a:t>
             </a:fld>
             <a:endParaRPr/>
           </a:p>
@@ -1378,7 +1378,7 @@
           <a:p>
             <a:fld id="{9E583DDF-CA54-461A-A486-592D2374C532}" type="datetimeFigureOut">
               <a:rPr lang="en-US"/>
-              <a:t>2/29/2016</a:t>
+              <a:t>3/1/2016</a:t>
             </a:fld>
             <a:endParaRPr/>
           </a:p>
@@ -1684,7 +1684,7 @@
           <a:p>
             <a:fld id="{9E583DDF-CA54-461A-A486-592D2374C532}" type="datetimeFigureOut">
               <a:rPr lang="en-US"/>
-              <a:t>2/29/2016</a:t>
+              <a:t>3/1/2016</a:t>
             </a:fld>
             <a:endParaRPr/>
           </a:p>
@@ -1988,7 +1988,7 @@
           <a:p>
             <a:fld id="{0A879FD0-C37A-4F50-8F3B-5FA0D9D0B42F}" type="datetimeFigureOut">
               <a:rPr lang="en-US"/>
-              <a:t>2/29/2016</a:t>
+              <a:t>3/1/2016</a:t>
             </a:fld>
             <a:endParaRPr/>
           </a:p>
@@ -2432,7 +2432,7 @@
           <a:p>
             <a:fld id="{9E583DDF-CA54-461A-A486-592D2374C532}" type="datetimeFigureOut">
               <a:rPr lang="en-US"/>
-              <a:t>2/29/2016</a:t>
+              <a:t>3/1/2016</a:t>
             </a:fld>
             <a:endParaRPr/>
           </a:p>
@@ -2562,7 +2562,7 @@
           <a:p>
             <a:fld id="{9E583DDF-CA54-461A-A486-592D2374C532}" type="datetimeFigureOut">
               <a:rPr lang="en-US"/>
-              <a:t>2/29/2016</a:t>
+              <a:t>3/1/2016</a:t>
             </a:fld>
             <a:endParaRPr/>
           </a:p>
@@ -2714,7 +2714,7 @@
           <a:p>
             <a:fld id="{9E583DDF-CA54-461A-A486-592D2374C532}" type="datetimeFigureOut">
               <a:rPr lang="en-US"/>
-              <a:t>2/29/2016</a:t>
+              <a:t>3/1/2016</a:t>
             </a:fld>
             <a:endParaRPr/>
           </a:p>
@@ -3012,7 +3012,7 @@
           <a:p>
             <a:fld id="{9E583DDF-CA54-461A-A486-592D2374C532}" type="datetimeFigureOut">
               <a:rPr lang="en-US"/>
-              <a:t>2/29/2016</a:t>
+              <a:t>3/1/2016</a:t>
             </a:fld>
             <a:endParaRPr/>
           </a:p>
@@ -3298,7 +3298,7 @@
           <a:p>
             <a:fld id="{9E583DDF-CA54-461A-A486-592D2374C532}" type="datetimeFigureOut">
               <a:rPr lang="en-US"/>
-              <a:t>2/29/2016</a:t>
+              <a:t>3/1/2016</a:t>
             </a:fld>
             <a:endParaRPr/>
           </a:p>
@@ -3569,7 +3569,7 @@
             <a:fld id="{9E583DDF-CA54-461A-A486-592D2374C532}" type="datetimeFigureOut">
               <a:rPr lang="en-US"/>
               <a:pPr/>
-              <a:t>2/29/2016</a:t>
+              <a:t>3/1/2016</a:t>
             </a:fld>
             <a:endParaRPr/>
           </a:p>
@@ -5209,7 +5209,7 @@
               <a:rPr lang="en-US" sz="2400" dirty="0">
                 <a:latin typeface="Consolas" panose="020B0609020204030204" pitchFamily="49" charset="0"/>
               </a:rPr>
-              <a:t>start atom .</a:t>
+              <a:t>atom .</a:t>
             </a:r>
           </a:p>
           <a:p>
@@ -6789,6 +6789,45 @@
           </a:p>
         </p:txBody>
       </p:sp>
+      <p:pic>
+        <p:nvPicPr>
+          <p:cNvPr id="19" name="Picture 2" descr="http://storage.vexxhost.net/v1/d7594b0298b54bcc9e4e0f252e1da2e4/blog/mean-socket-io-integration-tutorial%2Fsocketio-logo.png"/>
+          <p:cNvPicPr>
+            <a:picLocks noChangeAspect="1" noChangeArrowheads="1"/>
+          </p:cNvPicPr>
+          <p:nvPr/>
+        </p:nvPicPr>
+        <p:blipFill rotWithShape="1">
+          <a:blip r:embed="rId8" cstate="print">
+            <a:extLst>
+              <a:ext uri="{28A0092B-C50C-407E-A947-70E740481C1C}">
+                <a14:useLocalDpi xmlns:a14="http://schemas.microsoft.com/office/drawing/2010/main" val="0"/>
+              </a:ext>
+            </a:extLst>
+          </a:blip>
+          <a:srcRect l="4305" t="18439" r="5299" b="23702"/>
+          <a:stretch/>
+        </p:blipFill>
+        <p:spPr bwMode="auto">
+          <a:xfrm>
+            <a:off x="4698474" y="-5369"/>
+            <a:ext cx="2549970" cy="765832"/>
+          </a:xfrm>
+          <a:prstGeom prst="rect">
+            <a:avLst/>
+          </a:prstGeom>
+          <a:noFill/>
+          <a:extLst>
+            <a:ext uri="{909E8E84-426E-40DD-AFC4-6F175D3DCCD1}">
+              <a14:hiddenFill xmlns:a14="http://schemas.microsoft.com/office/drawing/2010/main">
+                <a:solidFill>
+                  <a:srgbClr val="FFFFFF"/>
+                </a:solidFill>
+              </a14:hiddenFill>
+            </a:ext>
+          </a:extLst>
+        </p:spPr>
+      </p:pic>
     </p:spTree>
     <p:extLst>
       <p:ext uri="{BB962C8B-B14F-4D97-AF65-F5344CB8AC3E}">
@@ -6811,6 +6850,557 @@
       </p:transition>
     </mc:Fallback>
   </mc:AlternateContent>
+  <p:timing>
+    <p:tnLst>
+      <p:par>
+        <p:cTn id="1" dur="indefinite" restart="never" nodeType="tmRoot">
+          <p:childTnLst>
+            <p:seq concurrent="1" nextAc="seek">
+              <p:cTn id="2" dur="indefinite" nodeType="mainSeq">
+                <p:childTnLst>
+                  <p:par>
+                    <p:cTn id="3" fill="hold">
+                      <p:stCondLst>
+                        <p:cond delay="indefinite"/>
+                      </p:stCondLst>
+                      <p:childTnLst>
+                        <p:par>
+                          <p:cTn id="4" fill="hold">
+                            <p:stCondLst>
+                              <p:cond delay="0"/>
+                            </p:stCondLst>
+                            <p:childTnLst>
+                              <p:par>
+                                <p:cTn id="5" presetID="10" presetClass="entr" presetSubtype="0" fill="hold" grpId="0" nodeType="clickEffect">
+                                  <p:stCondLst>
+                                    <p:cond delay="0"/>
+                                  </p:stCondLst>
+                                  <p:childTnLst>
+                                    <p:set>
+                                      <p:cBhvr>
+                                        <p:cTn id="6" dur="1" fill="hold">
+                                          <p:stCondLst>
+                                            <p:cond delay="0"/>
+                                          </p:stCondLst>
+                                        </p:cTn>
+                                        <p:tgtEl>
+                                          <p:spTgt spid="15"/>
+                                        </p:tgtEl>
+                                        <p:attrNameLst>
+                                          <p:attrName>style.visibility</p:attrName>
+                                        </p:attrNameLst>
+                                      </p:cBhvr>
+                                      <p:to>
+                                        <p:strVal val="visible"/>
+                                      </p:to>
+                                    </p:set>
+                                    <p:animEffect transition="in" filter="fade">
+                                      <p:cBhvr>
+                                        <p:cTn id="7" dur="500"/>
+                                        <p:tgtEl>
+                                          <p:spTgt spid="15"/>
+                                        </p:tgtEl>
+                                      </p:cBhvr>
+                                    </p:animEffect>
+                                  </p:childTnLst>
+                                  <p:subTnLst>
+                                    <p:set>
+                                      <p:cBhvr override="childStyle">
+                                        <p:cTn dur="1" fill="hold" display="0" masterRel="nextClick" afterEffect="1"/>
+                                        <p:tgtEl>
+                                          <p:spTgt spid="15"/>
+                                        </p:tgtEl>
+                                        <p:attrNameLst>
+                                          <p:attrName>style.visibility</p:attrName>
+                                        </p:attrNameLst>
+                                      </p:cBhvr>
+                                      <p:to>
+                                        <p:strVal val="hidden"/>
+                                      </p:to>
+                                    </p:set>
+                                  </p:subTnLst>
+                                </p:cTn>
+                              </p:par>
+                              <p:par>
+                                <p:cTn id="8" presetID="10" presetClass="entr" presetSubtype="0" fill="hold" nodeType="withEffect">
+                                  <p:stCondLst>
+                                    <p:cond delay="0"/>
+                                  </p:stCondLst>
+                                  <p:childTnLst>
+                                    <p:set>
+                                      <p:cBhvr>
+                                        <p:cTn id="9" dur="1" fill="hold">
+                                          <p:stCondLst>
+                                            <p:cond delay="0"/>
+                                          </p:stCondLst>
+                                        </p:cTn>
+                                        <p:tgtEl>
+                                          <p:spTgt spid="16"/>
+                                        </p:tgtEl>
+                                        <p:attrNameLst>
+                                          <p:attrName>style.visibility</p:attrName>
+                                        </p:attrNameLst>
+                                      </p:cBhvr>
+                                      <p:to>
+                                        <p:strVal val="visible"/>
+                                      </p:to>
+                                    </p:set>
+                                    <p:animEffect transition="in" filter="fade">
+                                      <p:cBhvr>
+                                        <p:cTn id="10" dur="500"/>
+                                        <p:tgtEl>
+                                          <p:spTgt spid="16"/>
+                                        </p:tgtEl>
+                                      </p:cBhvr>
+                                    </p:animEffect>
+                                  </p:childTnLst>
+                                  <p:subTnLst>
+                                    <p:set>
+                                      <p:cBhvr override="childStyle">
+                                        <p:cTn dur="1" fill="hold" display="0" masterRel="nextClick" afterEffect="1"/>
+                                        <p:tgtEl>
+                                          <p:spTgt spid="16"/>
+                                        </p:tgtEl>
+                                        <p:attrNameLst>
+                                          <p:attrName>style.visibility</p:attrName>
+                                        </p:attrNameLst>
+                                      </p:cBhvr>
+                                      <p:to>
+                                        <p:strVal val="hidden"/>
+                                      </p:to>
+                                    </p:set>
+                                  </p:subTnLst>
+                                </p:cTn>
+                              </p:par>
+                              <p:par>
+                                <p:cTn id="11" presetID="10" presetClass="entr" presetSubtype="0" fill="hold" grpId="0" nodeType="withEffect">
+                                  <p:stCondLst>
+                                    <p:cond delay="0"/>
+                                  </p:stCondLst>
+                                  <p:childTnLst>
+                                    <p:set>
+                                      <p:cBhvr>
+                                        <p:cTn id="12" dur="1" fill="hold">
+                                          <p:stCondLst>
+                                            <p:cond delay="0"/>
+                                          </p:stCondLst>
+                                        </p:cTn>
+                                        <p:tgtEl>
+                                          <p:spTgt spid="22"/>
+                                        </p:tgtEl>
+                                        <p:attrNameLst>
+                                          <p:attrName>style.visibility</p:attrName>
+                                        </p:attrNameLst>
+                                      </p:cBhvr>
+                                      <p:to>
+                                        <p:strVal val="visible"/>
+                                      </p:to>
+                                    </p:set>
+                                    <p:animEffect transition="in" filter="fade">
+                                      <p:cBhvr>
+                                        <p:cTn id="13" dur="500"/>
+                                        <p:tgtEl>
+                                          <p:spTgt spid="22"/>
+                                        </p:tgtEl>
+                                      </p:cBhvr>
+                                    </p:animEffect>
+                                  </p:childTnLst>
+                                  <p:subTnLst>
+                                    <p:set>
+                                      <p:cBhvr override="childStyle">
+                                        <p:cTn dur="1" fill="hold" display="0" masterRel="nextClick" afterEffect="1"/>
+                                        <p:tgtEl>
+                                          <p:spTgt spid="22"/>
+                                        </p:tgtEl>
+                                        <p:attrNameLst>
+                                          <p:attrName>style.visibility</p:attrName>
+                                        </p:attrNameLst>
+                                      </p:cBhvr>
+                                      <p:to>
+                                        <p:strVal val="hidden"/>
+                                      </p:to>
+                                    </p:set>
+                                  </p:subTnLst>
+                                </p:cTn>
+                              </p:par>
+                            </p:childTnLst>
+                          </p:cTn>
+                        </p:par>
+                      </p:childTnLst>
+                    </p:cTn>
+                  </p:par>
+                  <p:par>
+                    <p:cTn id="14" fill="hold">
+                      <p:stCondLst>
+                        <p:cond delay="indefinite"/>
+                      </p:stCondLst>
+                      <p:childTnLst>
+                        <p:par>
+                          <p:cTn id="15" fill="hold">
+                            <p:stCondLst>
+                              <p:cond delay="0"/>
+                            </p:stCondLst>
+                            <p:childTnLst>
+                              <p:par>
+                                <p:cTn id="16" presetID="10" presetClass="entr" presetSubtype="0" fill="hold" grpId="0" nodeType="clickEffect">
+                                  <p:stCondLst>
+                                    <p:cond delay="0"/>
+                                  </p:stCondLst>
+                                  <p:childTnLst>
+                                    <p:set>
+                                      <p:cBhvr>
+                                        <p:cTn id="17" dur="1" fill="hold">
+                                          <p:stCondLst>
+                                            <p:cond delay="0"/>
+                                          </p:stCondLst>
+                                        </p:cTn>
+                                        <p:tgtEl>
+                                          <p:spTgt spid="25"/>
+                                        </p:tgtEl>
+                                        <p:attrNameLst>
+                                          <p:attrName>style.visibility</p:attrName>
+                                        </p:attrNameLst>
+                                      </p:cBhvr>
+                                      <p:to>
+                                        <p:strVal val="visible"/>
+                                      </p:to>
+                                    </p:set>
+                                    <p:animEffect transition="in" filter="fade">
+                                      <p:cBhvr>
+                                        <p:cTn id="18" dur="500"/>
+                                        <p:tgtEl>
+                                          <p:spTgt spid="25"/>
+                                        </p:tgtEl>
+                                      </p:cBhvr>
+                                    </p:animEffect>
+                                  </p:childTnLst>
+                                  <p:subTnLst>
+                                    <p:set>
+                                      <p:cBhvr override="childStyle">
+                                        <p:cTn dur="1" fill="hold" display="0" masterRel="nextClick" afterEffect="1"/>
+                                        <p:tgtEl>
+                                          <p:spTgt spid="25"/>
+                                        </p:tgtEl>
+                                        <p:attrNameLst>
+                                          <p:attrName>style.visibility</p:attrName>
+                                        </p:attrNameLst>
+                                      </p:cBhvr>
+                                      <p:to>
+                                        <p:strVal val="hidden"/>
+                                      </p:to>
+                                    </p:set>
+                                  </p:subTnLst>
+                                </p:cTn>
+                              </p:par>
+                              <p:par>
+                                <p:cTn id="19" presetID="10" presetClass="entr" presetSubtype="0" fill="hold" nodeType="withEffect">
+                                  <p:stCondLst>
+                                    <p:cond delay="0"/>
+                                  </p:stCondLst>
+                                  <p:childTnLst>
+                                    <p:set>
+                                      <p:cBhvr>
+                                        <p:cTn id="20" dur="1" fill="hold">
+                                          <p:stCondLst>
+                                            <p:cond delay="0"/>
+                                          </p:stCondLst>
+                                        </p:cTn>
+                                        <p:tgtEl>
+                                          <p:spTgt spid="26"/>
+                                        </p:tgtEl>
+                                        <p:attrNameLst>
+                                          <p:attrName>style.visibility</p:attrName>
+                                        </p:attrNameLst>
+                                      </p:cBhvr>
+                                      <p:to>
+                                        <p:strVal val="visible"/>
+                                      </p:to>
+                                    </p:set>
+                                    <p:animEffect transition="in" filter="fade">
+                                      <p:cBhvr>
+                                        <p:cTn id="21" dur="500"/>
+                                        <p:tgtEl>
+                                          <p:spTgt spid="26"/>
+                                        </p:tgtEl>
+                                      </p:cBhvr>
+                                    </p:animEffect>
+                                  </p:childTnLst>
+                                  <p:subTnLst>
+                                    <p:set>
+                                      <p:cBhvr override="childStyle">
+                                        <p:cTn dur="1" fill="hold" display="0" masterRel="nextClick" afterEffect="1"/>
+                                        <p:tgtEl>
+                                          <p:spTgt spid="26"/>
+                                        </p:tgtEl>
+                                        <p:attrNameLst>
+                                          <p:attrName>style.visibility</p:attrName>
+                                        </p:attrNameLst>
+                                      </p:cBhvr>
+                                      <p:to>
+                                        <p:strVal val="hidden"/>
+                                      </p:to>
+                                    </p:set>
+                                  </p:subTnLst>
+                                </p:cTn>
+                              </p:par>
+                              <p:par>
+                                <p:cTn id="22" presetID="10" presetClass="entr" presetSubtype="0" fill="hold" grpId="0" nodeType="withEffect">
+                                  <p:stCondLst>
+                                    <p:cond delay="0"/>
+                                  </p:stCondLst>
+                                  <p:childTnLst>
+                                    <p:set>
+                                      <p:cBhvr>
+                                        <p:cTn id="23" dur="1" fill="hold">
+                                          <p:stCondLst>
+                                            <p:cond delay="0"/>
+                                          </p:stCondLst>
+                                        </p:cTn>
+                                        <p:tgtEl>
+                                          <p:spTgt spid="27"/>
+                                        </p:tgtEl>
+                                        <p:attrNameLst>
+                                          <p:attrName>style.visibility</p:attrName>
+                                        </p:attrNameLst>
+                                      </p:cBhvr>
+                                      <p:to>
+                                        <p:strVal val="visible"/>
+                                      </p:to>
+                                    </p:set>
+                                    <p:animEffect transition="in" filter="fade">
+                                      <p:cBhvr>
+                                        <p:cTn id="24" dur="500"/>
+                                        <p:tgtEl>
+                                          <p:spTgt spid="27"/>
+                                        </p:tgtEl>
+                                      </p:cBhvr>
+                                    </p:animEffect>
+                                  </p:childTnLst>
+                                  <p:subTnLst>
+                                    <p:set>
+                                      <p:cBhvr override="childStyle">
+                                        <p:cTn dur="1" fill="hold" display="0" masterRel="nextClick" afterEffect="1"/>
+                                        <p:tgtEl>
+                                          <p:spTgt spid="27"/>
+                                        </p:tgtEl>
+                                        <p:attrNameLst>
+                                          <p:attrName>style.visibility</p:attrName>
+                                        </p:attrNameLst>
+                                      </p:cBhvr>
+                                      <p:to>
+                                        <p:strVal val="hidden"/>
+                                      </p:to>
+                                    </p:set>
+                                  </p:subTnLst>
+                                </p:cTn>
+                              </p:par>
+                            </p:childTnLst>
+                          </p:cTn>
+                        </p:par>
+                      </p:childTnLst>
+                    </p:cTn>
+                  </p:par>
+                  <p:par>
+                    <p:cTn id="25" fill="hold">
+                      <p:stCondLst>
+                        <p:cond delay="indefinite"/>
+                      </p:stCondLst>
+                      <p:childTnLst>
+                        <p:par>
+                          <p:cTn id="26" fill="hold">
+                            <p:stCondLst>
+                              <p:cond delay="0"/>
+                            </p:stCondLst>
+                            <p:childTnLst>
+                              <p:par>
+                                <p:cTn id="27" presetID="10" presetClass="entr" presetSubtype="0" fill="hold" grpId="0" nodeType="clickEffect">
+                                  <p:stCondLst>
+                                    <p:cond delay="0"/>
+                                  </p:stCondLst>
+                                  <p:childTnLst>
+                                    <p:set>
+                                      <p:cBhvr>
+                                        <p:cTn id="28" dur="1" fill="hold">
+                                          <p:stCondLst>
+                                            <p:cond delay="0"/>
+                                          </p:stCondLst>
+                                        </p:cTn>
+                                        <p:tgtEl>
+                                          <p:spTgt spid="38"/>
+                                        </p:tgtEl>
+                                        <p:attrNameLst>
+                                          <p:attrName>style.visibility</p:attrName>
+                                        </p:attrNameLst>
+                                      </p:cBhvr>
+                                      <p:to>
+                                        <p:strVal val="visible"/>
+                                      </p:to>
+                                    </p:set>
+                                    <p:animEffect transition="in" filter="fade">
+                                      <p:cBhvr>
+                                        <p:cTn id="29" dur="500"/>
+                                        <p:tgtEl>
+                                          <p:spTgt spid="38"/>
+                                        </p:tgtEl>
+                                      </p:cBhvr>
+                                    </p:animEffect>
+                                  </p:childTnLst>
+                                  <p:subTnLst>
+                                    <p:set>
+                                      <p:cBhvr override="childStyle">
+                                        <p:cTn dur="1" fill="hold" display="0" masterRel="nextClick" afterEffect="1"/>
+                                        <p:tgtEl>
+                                          <p:spTgt spid="38"/>
+                                        </p:tgtEl>
+                                        <p:attrNameLst>
+                                          <p:attrName>style.visibility</p:attrName>
+                                        </p:attrNameLst>
+                                      </p:cBhvr>
+                                      <p:to>
+                                        <p:strVal val="hidden"/>
+                                      </p:to>
+                                    </p:set>
+                                  </p:subTnLst>
+                                </p:cTn>
+                              </p:par>
+                              <p:par>
+                                <p:cTn id="30" presetID="10" presetClass="entr" presetSubtype="0" fill="hold" nodeType="withEffect">
+                                  <p:stCondLst>
+                                    <p:cond delay="0"/>
+                                  </p:stCondLst>
+                                  <p:childTnLst>
+                                    <p:set>
+                                      <p:cBhvr>
+                                        <p:cTn id="31" dur="1" fill="hold">
+                                          <p:stCondLst>
+                                            <p:cond delay="0"/>
+                                          </p:stCondLst>
+                                        </p:cTn>
+                                        <p:tgtEl>
+                                          <p:spTgt spid="39"/>
+                                        </p:tgtEl>
+                                        <p:attrNameLst>
+                                          <p:attrName>style.visibility</p:attrName>
+                                        </p:attrNameLst>
+                                      </p:cBhvr>
+                                      <p:to>
+                                        <p:strVal val="visible"/>
+                                      </p:to>
+                                    </p:set>
+                                    <p:animEffect transition="in" filter="fade">
+                                      <p:cBhvr>
+                                        <p:cTn id="32" dur="500"/>
+                                        <p:tgtEl>
+                                          <p:spTgt spid="39"/>
+                                        </p:tgtEl>
+                                      </p:cBhvr>
+                                    </p:animEffect>
+                                  </p:childTnLst>
+                                  <p:subTnLst>
+                                    <p:set>
+                                      <p:cBhvr override="childStyle">
+                                        <p:cTn dur="1" fill="hold" display="0" masterRel="nextClick" afterEffect="1"/>
+                                        <p:tgtEl>
+                                          <p:spTgt spid="39"/>
+                                        </p:tgtEl>
+                                        <p:attrNameLst>
+                                          <p:attrName>style.visibility</p:attrName>
+                                        </p:attrNameLst>
+                                      </p:cBhvr>
+                                      <p:to>
+                                        <p:strVal val="hidden"/>
+                                      </p:to>
+                                    </p:set>
+                                  </p:subTnLst>
+                                </p:cTn>
+                              </p:par>
+                              <p:par>
+                                <p:cTn id="33" presetID="10" presetClass="entr" presetSubtype="0" fill="hold" grpId="0" nodeType="withEffect">
+                                  <p:stCondLst>
+                                    <p:cond delay="0"/>
+                                  </p:stCondLst>
+                                  <p:childTnLst>
+                                    <p:set>
+                                      <p:cBhvr>
+                                        <p:cTn id="34" dur="1" fill="hold">
+                                          <p:stCondLst>
+                                            <p:cond delay="0"/>
+                                          </p:stCondLst>
+                                        </p:cTn>
+                                        <p:tgtEl>
+                                          <p:spTgt spid="40"/>
+                                        </p:tgtEl>
+                                        <p:attrNameLst>
+                                          <p:attrName>style.visibility</p:attrName>
+                                        </p:attrNameLst>
+                                      </p:cBhvr>
+                                      <p:to>
+                                        <p:strVal val="visible"/>
+                                      </p:to>
+                                    </p:set>
+                                    <p:animEffect transition="in" filter="fade">
+                                      <p:cBhvr>
+                                        <p:cTn id="35" dur="500"/>
+                                        <p:tgtEl>
+                                          <p:spTgt spid="40"/>
+                                        </p:tgtEl>
+                                      </p:cBhvr>
+                                    </p:animEffect>
+                                  </p:childTnLst>
+                                  <p:subTnLst>
+                                    <p:set>
+                                      <p:cBhvr override="childStyle">
+                                        <p:cTn dur="1" fill="hold" display="0" masterRel="nextClick" afterEffect="1"/>
+                                        <p:tgtEl>
+                                          <p:spTgt spid="40"/>
+                                        </p:tgtEl>
+                                        <p:attrNameLst>
+                                          <p:attrName>style.visibility</p:attrName>
+                                        </p:attrNameLst>
+                                      </p:cBhvr>
+                                      <p:to>
+                                        <p:strVal val="hidden"/>
+                                      </p:to>
+                                    </p:set>
+                                  </p:subTnLst>
+                                </p:cTn>
+                              </p:par>
+                            </p:childTnLst>
+                          </p:cTn>
+                        </p:par>
+                      </p:childTnLst>
+                    </p:cTn>
+                  </p:par>
+                </p:childTnLst>
+              </p:cTn>
+              <p:prevCondLst>
+                <p:cond evt="onPrev" delay="0">
+                  <p:tgtEl>
+                    <p:sldTgt/>
+                  </p:tgtEl>
+                </p:cond>
+              </p:prevCondLst>
+              <p:nextCondLst>
+                <p:cond evt="onNext" delay="0">
+                  <p:tgtEl>
+                    <p:sldTgt/>
+                  </p:tgtEl>
+                </p:cond>
+              </p:nextCondLst>
+            </p:seq>
+          </p:childTnLst>
+        </p:cTn>
+      </p:par>
+    </p:tnLst>
+    <p:bldLst>
+      <p:bldP spid="15" grpId="0" animBg="1"/>
+      <p:bldP spid="22" grpId="0" animBg="1"/>
+      <p:bldP spid="25" grpId="0" animBg="1"/>
+      <p:bldP spid="27" grpId="0" animBg="1"/>
+      <p:bldP spid="38" grpId="0" animBg="1"/>
+      <p:bldP spid="40" grpId="0" animBg="1"/>
+    </p:bldLst>
+  </p:timing>
 </p:sld>
 </file>
 
@@ -10287,6 +10877,47 @@
           </a:fontRef>
         </p:style>
       </p:cxnSp>
+      <p:cxnSp>
+        <p:nvCxnSpPr>
+          <p:cNvPr id="39" name="Elbow Connector 38"/>
+          <p:cNvCxnSpPr>
+            <a:stCxn id="106" idx="0"/>
+            <a:endCxn id="101" idx="0"/>
+          </p:cNvCxnSpPr>
+          <p:nvPr/>
+        </p:nvCxnSpPr>
+        <p:spPr>
+          <a:xfrm rot="16200000" flipV="1">
+            <a:off x="6353285" y="4224983"/>
+            <a:ext cx="394448" cy="2893375"/>
+          </a:xfrm>
+          <a:prstGeom prst="bentConnector3">
+            <a:avLst>
+              <a:gd name="adj1" fmla="val 153090"/>
+            </a:avLst>
+          </a:prstGeom>
+          <a:ln w="19050">
+            <a:solidFill>
+              <a:schemeClr val="accent1"/>
+            </a:solidFill>
+            <a:prstDash val="dash"/>
+          </a:ln>
+        </p:spPr>
+        <p:style>
+          <a:lnRef idx="1">
+            <a:schemeClr val="accent1"/>
+          </a:lnRef>
+          <a:fillRef idx="0">
+            <a:schemeClr val="accent1"/>
+          </a:fillRef>
+          <a:effectRef idx="0">
+            <a:schemeClr val="accent1"/>
+          </a:effectRef>
+          <a:fontRef idx="minor">
+            <a:schemeClr val="tx1"/>
+          </a:fontRef>
+        </p:style>
+      </p:cxnSp>
     </p:spTree>
     <p:extLst>
       <p:ext uri="{BB962C8B-B14F-4D97-AF65-F5344CB8AC3E}">
@@ -10309,6 +10940,1848 @@
       </p:transition>
     </mc:Fallback>
   </mc:AlternateContent>
+  <p:timing>
+    <p:tnLst>
+      <p:par>
+        <p:cTn id="1" dur="indefinite" restart="never" nodeType="tmRoot">
+          <p:childTnLst>
+            <p:seq concurrent="1" nextAc="seek">
+              <p:cTn id="2" dur="indefinite" nodeType="mainSeq">
+                <p:childTnLst>
+                  <p:par>
+                    <p:cTn id="3" fill="hold">
+                      <p:stCondLst>
+                        <p:cond delay="indefinite"/>
+                      </p:stCondLst>
+                      <p:childTnLst>
+                        <p:par>
+                          <p:cTn id="4" fill="hold">
+                            <p:stCondLst>
+                              <p:cond delay="0"/>
+                            </p:stCondLst>
+                            <p:childTnLst>
+                              <p:par>
+                                <p:cTn id="5" presetID="10" presetClass="entr" presetSubtype="0" fill="hold" nodeType="clickEffect">
+                                  <p:stCondLst>
+                                    <p:cond delay="0"/>
+                                  </p:stCondLst>
+                                  <p:childTnLst>
+                                    <p:set>
+                                      <p:cBhvr>
+                                        <p:cTn id="6" dur="1" fill="hold">
+                                          <p:stCondLst>
+                                            <p:cond delay="0"/>
+                                          </p:stCondLst>
+                                        </p:cTn>
+                                        <p:tgtEl>
+                                          <p:spTgt spid="2048"/>
+                                        </p:tgtEl>
+                                        <p:attrNameLst>
+                                          <p:attrName>style.visibility</p:attrName>
+                                        </p:attrNameLst>
+                                      </p:cBhvr>
+                                      <p:to>
+                                        <p:strVal val="visible"/>
+                                      </p:to>
+                                    </p:set>
+                                    <p:animEffect transition="in" filter="fade">
+                                      <p:cBhvr>
+                                        <p:cTn id="7" dur="500"/>
+                                        <p:tgtEl>
+                                          <p:spTgt spid="2048"/>
+                                        </p:tgtEl>
+                                      </p:cBhvr>
+                                    </p:animEffect>
+                                  </p:childTnLst>
+                                  <p:subTnLst>
+                                    <p:set>
+                                      <p:cBhvr override="childStyle">
+                                        <p:cTn dur="1" fill="hold" display="0" masterRel="nextClick" afterEffect="1"/>
+                                        <p:tgtEl>
+                                          <p:spTgt spid="2048"/>
+                                        </p:tgtEl>
+                                        <p:attrNameLst>
+                                          <p:attrName>style.visibility</p:attrName>
+                                        </p:attrNameLst>
+                                      </p:cBhvr>
+                                      <p:to>
+                                        <p:strVal val="hidden"/>
+                                      </p:to>
+                                    </p:set>
+                                  </p:subTnLst>
+                                </p:cTn>
+                              </p:par>
+                              <p:par>
+                                <p:cTn id="8" presetID="10" presetClass="entr" presetSubtype="0" fill="hold" grpId="0" nodeType="withEffect">
+                                  <p:stCondLst>
+                                    <p:cond delay="0"/>
+                                  </p:stCondLst>
+                                  <p:childTnLst>
+                                    <p:set>
+                                      <p:cBhvr>
+                                        <p:cTn id="9" dur="1" fill="hold">
+                                          <p:stCondLst>
+                                            <p:cond delay="0"/>
+                                          </p:stCondLst>
+                                        </p:cTn>
+                                        <p:tgtEl>
+                                          <p:spTgt spid="33"/>
+                                        </p:tgtEl>
+                                        <p:attrNameLst>
+                                          <p:attrName>style.visibility</p:attrName>
+                                        </p:attrNameLst>
+                                      </p:cBhvr>
+                                      <p:to>
+                                        <p:strVal val="visible"/>
+                                      </p:to>
+                                    </p:set>
+                                    <p:animEffect transition="in" filter="fade">
+                                      <p:cBhvr>
+                                        <p:cTn id="10" dur="500"/>
+                                        <p:tgtEl>
+                                          <p:spTgt spid="33"/>
+                                        </p:tgtEl>
+                                      </p:cBhvr>
+                                    </p:animEffect>
+                                  </p:childTnLst>
+                                  <p:subTnLst>
+                                    <p:set>
+                                      <p:cBhvr override="childStyle">
+                                        <p:cTn dur="1" fill="hold" display="0" masterRel="nextClick" afterEffect="1"/>
+                                        <p:tgtEl>
+                                          <p:spTgt spid="33"/>
+                                        </p:tgtEl>
+                                        <p:attrNameLst>
+                                          <p:attrName>style.visibility</p:attrName>
+                                        </p:attrNameLst>
+                                      </p:cBhvr>
+                                      <p:to>
+                                        <p:strVal val="hidden"/>
+                                      </p:to>
+                                    </p:set>
+                                  </p:subTnLst>
+                                </p:cTn>
+                              </p:par>
+                              <p:par>
+                                <p:cTn id="11" presetID="10" presetClass="entr" presetSubtype="0" fill="hold" grpId="0" nodeType="withEffect">
+                                  <p:stCondLst>
+                                    <p:cond delay="0"/>
+                                  </p:stCondLst>
+                                  <p:childTnLst>
+                                    <p:set>
+                                      <p:cBhvr>
+                                        <p:cTn id="12" dur="1" fill="hold">
+                                          <p:stCondLst>
+                                            <p:cond delay="0"/>
+                                          </p:stCondLst>
+                                        </p:cTn>
+                                        <p:tgtEl>
+                                          <p:spTgt spid="11"/>
+                                        </p:tgtEl>
+                                        <p:attrNameLst>
+                                          <p:attrName>style.visibility</p:attrName>
+                                        </p:attrNameLst>
+                                      </p:cBhvr>
+                                      <p:to>
+                                        <p:strVal val="visible"/>
+                                      </p:to>
+                                    </p:set>
+                                    <p:animEffect transition="in" filter="fade">
+                                      <p:cBhvr>
+                                        <p:cTn id="13" dur="500"/>
+                                        <p:tgtEl>
+                                          <p:spTgt spid="11"/>
+                                        </p:tgtEl>
+                                      </p:cBhvr>
+                                    </p:animEffect>
+                                  </p:childTnLst>
+                                  <p:subTnLst>
+                                    <p:set>
+                                      <p:cBhvr override="childStyle">
+                                        <p:cTn dur="1" fill="hold" display="0" masterRel="nextClick" afterEffect="1"/>
+                                        <p:tgtEl>
+                                          <p:spTgt spid="11"/>
+                                        </p:tgtEl>
+                                        <p:attrNameLst>
+                                          <p:attrName>style.visibility</p:attrName>
+                                        </p:attrNameLst>
+                                      </p:cBhvr>
+                                      <p:to>
+                                        <p:strVal val="hidden"/>
+                                      </p:to>
+                                    </p:set>
+                                  </p:subTnLst>
+                                </p:cTn>
+                              </p:par>
+                            </p:childTnLst>
+                          </p:cTn>
+                        </p:par>
+                      </p:childTnLst>
+                    </p:cTn>
+                  </p:par>
+                  <p:par>
+                    <p:cTn id="14" fill="hold">
+                      <p:stCondLst>
+                        <p:cond delay="indefinite"/>
+                      </p:stCondLst>
+                      <p:childTnLst>
+                        <p:par>
+                          <p:cTn id="15" fill="hold">
+                            <p:stCondLst>
+                              <p:cond delay="0"/>
+                            </p:stCondLst>
+                            <p:childTnLst>
+                              <p:par>
+                                <p:cTn id="16" presetID="10" presetClass="entr" presetSubtype="0" fill="hold" grpId="0" nodeType="clickEffect">
+                                  <p:stCondLst>
+                                    <p:cond delay="0"/>
+                                  </p:stCondLst>
+                                  <p:childTnLst>
+                                    <p:set>
+                                      <p:cBhvr>
+                                        <p:cTn id="17" dur="1" fill="hold">
+                                          <p:stCondLst>
+                                            <p:cond delay="0"/>
+                                          </p:stCondLst>
+                                        </p:cTn>
+                                        <p:tgtEl>
+                                          <p:spTgt spid="40"/>
+                                        </p:tgtEl>
+                                        <p:attrNameLst>
+                                          <p:attrName>style.visibility</p:attrName>
+                                        </p:attrNameLst>
+                                      </p:cBhvr>
+                                      <p:to>
+                                        <p:strVal val="visible"/>
+                                      </p:to>
+                                    </p:set>
+                                    <p:animEffect transition="in" filter="fade">
+                                      <p:cBhvr>
+                                        <p:cTn id="18" dur="500"/>
+                                        <p:tgtEl>
+                                          <p:spTgt spid="40"/>
+                                        </p:tgtEl>
+                                      </p:cBhvr>
+                                    </p:animEffect>
+                                  </p:childTnLst>
+                                  <p:subTnLst>
+                                    <p:set>
+                                      <p:cBhvr override="childStyle">
+                                        <p:cTn dur="1" fill="hold" display="0" masterRel="nextClick" afterEffect="1"/>
+                                        <p:tgtEl>
+                                          <p:spTgt spid="40"/>
+                                        </p:tgtEl>
+                                        <p:attrNameLst>
+                                          <p:attrName>style.visibility</p:attrName>
+                                        </p:attrNameLst>
+                                      </p:cBhvr>
+                                      <p:to>
+                                        <p:strVal val="hidden"/>
+                                      </p:to>
+                                    </p:set>
+                                  </p:subTnLst>
+                                </p:cTn>
+                              </p:par>
+                              <p:par>
+                                <p:cTn id="19" presetID="10" presetClass="entr" presetSubtype="0" fill="hold" nodeType="withEffect">
+                                  <p:stCondLst>
+                                    <p:cond delay="0"/>
+                                  </p:stCondLst>
+                                  <p:childTnLst>
+                                    <p:set>
+                                      <p:cBhvr>
+                                        <p:cTn id="20" dur="1" fill="hold">
+                                          <p:stCondLst>
+                                            <p:cond delay="0"/>
+                                          </p:stCondLst>
+                                        </p:cTn>
+                                        <p:tgtEl>
+                                          <p:spTgt spid="2055"/>
+                                        </p:tgtEl>
+                                        <p:attrNameLst>
+                                          <p:attrName>style.visibility</p:attrName>
+                                        </p:attrNameLst>
+                                      </p:cBhvr>
+                                      <p:to>
+                                        <p:strVal val="visible"/>
+                                      </p:to>
+                                    </p:set>
+                                    <p:animEffect transition="in" filter="fade">
+                                      <p:cBhvr>
+                                        <p:cTn id="21" dur="500"/>
+                                        <p:tgtEl>
+                                          <p:spTgt spid="2055"/>
+                                        </p:tgtEl>
+                                      </p:cBhvr>
+                                    </p:animEffect>
+                                  </p:childTnLst>
+                                  <p:subTnLst>
+                                    <p:set>
+                                      <p:cBhvr override="childStyle">
+                                        <p:cTn dur="1" fill="hold" display="0" masterRel="nextClick" afterEffect="1"/>
+                                        <p:tgtEl>
+                                          <p:spTgt spid="2055"/>
+                                        </p:tgtEl>
+                                        <p:attrNameLst>
+                                          <p:attrName>style.visibility</p:attrName>
+                                        </p:attrNameLst>
+                                      </p:cBhvr>
+                                      <p:to>
+                                        <p:strVal val="hidden"/>
+                                      </p:to>
+                                    </p:set>
+                                  </p:subTnLst>
+                                </p:cTn>
+                              </p:par>
+                              <p:par>
+                                <p:cTn id="22" presetID="10" presetClass="entr" presetSubtype="0" fill="hold" grpId="0" nodeType="withEffect">
+                                  <p:stCondLst>
+                                    <p:cond delay="0"/>
+                                  </p:stCondLst>
+                                  <p:childTnLst>
+                                    <p:set>
+                                      <p:cBhvr>
+                                        <p:cTn id="23" dur="1" fill="hold">
+                                          <p:stCondLst>
+                                            <p:cond delay="0"/>
+                                          </p:stCondLst>
+                                        </p:cTn>
+                                        <p:tgtEl>
+                                          <p:spTgt spid="41"/>
+                                        </p:tgtEl>
+                                        <p:attrNameLst>
+                                          <p:attrName>style.visibility</p:attrName>
+                                        </p:attrNameLst>
+                                      </p:cBhvr>
+                                      <p:to>
+                                        <p:strVal val="visible"/>
+                                      </p:to>
+                                    </p:set>
+                                    <p:animEffect transition="in" filter="fade">
+                                      <p:cBhvr>
+                                        <p:cTn id="24" dur="500"/>
+                                        <p:tgtEl>
+                                          <p:spTgt spid="41"/>
+                                        </p:tgtEl>
+                                      </p:cBhvr>
+                                    </p:animEffect>
+                                  </p:childTnLst>
+                                  <p:subTnLst>
+                                    <p:set>
+                                      <p:cBhvr override="childStyle">
+                                        <p:cTn dur="1" fill="hold" display="0" masterRel="nextClick" afterEffect="1"/>
+                                        <p:tgtEl>
+                                          <p:spTgt spid="41"/>
+                                        </p:tgtEl>
+                                        <p:attrNameLst>
+                                          <p:attrName>style.visibility</p:attrName>
+                                        </p:attrNameLst>
+                                      </p:cBhvr>
+                                      <p:to>
+                                        <p:strVal val="hidden"/>
+                                      </p:to>
+                                    </p:set>
+                                  </p:subTnLst>
+                                </p:cTn>
+                              </p:par>
+                            </p:childTnLst>
+                          </p:cTn>
+                        </p:par>
+                      </p:childTnLst>
+                    </p:cTn>
+                  </p:par>
+                  <p:par>
+                    <p:cTn id="25" fill="hold">
+                      <p:stCondLst>
+                        <p:cond delay="indefinite"/>
+                      </p:stCondLst>
+                      <p:childTnLst>
+                        <p:par>
+                          <p:cTn id="26" fill="hold">
+                            <p:stCondLst>
+                              <p:cond delay="0"/>
+                            </p:stCondLst>
+                            <p:childTnLst>
+                              <p:par>
+                                <p:cTn id="27" presetID="10" presetClass="entr" presetSubtype="0" fill="hold" grpId="0" nodeType="clickEffect">
+                                  <p:stCondLst>
+                                    <p:cond delay="0"/>
+                                  </p:stCondLst>
+                                  <p:childTnLst>
+                                    <p:set>
+                                      <p:cBhvr>
+                                        <p:cTn id="28" dur="1" fill="hold">
+                                          <p:stCondLst>
+                                            <p:cond delay="0"/>
+                                          </p:stCondLst>
+                                        </p:cTn>
+                                        <p:tgtEl>
+                                          <p:spTgt spid="46"/>
+                                        </p:tgtEl>
+                                        <p:attrNameLst>
+                                          <p:attrName>style.visibility</p:attrName>
+                                        </p:attrNameLst>
+                                      </p:cBhvr>
+                                      <p:to>
+                                        <p:strVal val="visible"/>
+                                      </p:to>
+                                    </p:set>
+                                    <p:animEffect transition="in" filter="fade">
+                                      <p:cBhvr>
+                                        <p:cTn id="29" dur="500"/>
+                                        <p:tgtEl>
+                                          <p:spTgt spid="46"/>
+                                        </p:tgtEl>
+                                      </p:cBhvr>
+                                    </p:animEffect>
+                                  </p:childTnLst>
+                                  <p:subTnLst>
+                                    <p:set>
+                                      <p:cBhvr override="childStyle">
+                                        <p:cTn dur="1" fill="hold" display="0" masterRel="nextClick" afterEffect="1"/>
+                                        <p:tgtEl>
+                                          <p:spTgt spid="46"/>
+                                        </p:tgtEl>
+                                        <p:attrNameLst>
+                                          <p:attrName>style.visibility</p:attrName>
+                                        </p:attrNameLst>
+                                      </p:cBhvr>
+                                      <p:to>
+                                        <p:strVal val="hidden"/>
+                                      </p:to>
+                                    </p:set>
+                                  </p:subTnLst>
+                                </p:cTn>
+                              </p:par>
+                              <p:par>
+                                <p:cTn id="30" presetID="10" presetClass="entr" presetSubtype="0" fill="hold" nodeType="withEffect">
+                                  <p:stCondLst>
+                                    <p:cond delay="0"/>
+                                  </p:stCondLst>
+                                  <p:childTnLst>
+                                    <p:set>
+                                      <p:cBhvr>
+                                        <p:cTn id="31" dur="1" fill="hold">
+                                          <p:stCondLst>
+                                            <p:cond delay="0"/>
+                                          </p:stCondLst>
+                                        </p:cTn>
+                                        <p:tgtEl>
+                                          <p:spTgt spid="47"/>
+                                        </p:tgtEl>
+                                        <p:attrNameLst>
+                                          <p:attrName>style.visibility</p:attrName>
+                                        </p:attrNameLst>
+                                      </p:cBhvr>
+                                      <p:to>
+                                        <p:strVal val="visible"/>
+                                      </p:to>
+                                    </p:set>
+                                    <p:animEffect transition="in" filter="fade">
+                                      <p:cBhvr>
+                                        <p:cTn id="32" dur="500"/>
+                                        <p:tgtEl>
+                                          <p:spTgt spid="47"/>
+                                        </p:tgtEl>
+                                      </p:cBhvr>
+                                    </p:animEffect>
+                                  </p:childTnLst>
+                                  <p:subTnLst>
+                                    <p:set>
+                                      <p:cBhvr override="childStyle">
+                                        <p:cTn dur="1" fill="hold" display="0" masterRel="nextClick" afterEffect="1"/>
+                                        <p:tgtEl>
+                                          <p:spTgt spid="47"/>
+                                        </p:tgtEl>
+                                        <p:attrNameLst>
+                                          <p:attrName>style.visibility</p:attrName>
+                                        </p:attrNameLst>
+                                      </p:cBhvr>
+                                      <p:to>
+                                        <p:strVal val="hidden"/>
+                                      </p:to>
+                                    </p:set>
+                                  </p:subTnLst>
+                                </p:cTn>
+                              </p:par>
+                              <p:par>
+                                <p:cTn id="33" presetID="10" presetClass="entr" presetSubtype="0" fill="hold" grpId="0" nodeType="withEffect">
+                                  <p:stCondLst>
+                                    <p:cond delay="0"/>
+                                  </p:stCondLst>
+                                  <p:childTnLst>
+                                    <p:set>
+                                      <p:cBhvr>
+                                        <p:cTn id="34" dur="1" fill="hold">
+                                          <p:stCondLst>
+                                            <p:cond delay="0"/>
+                                          </p:stCondLst>
+                                        </p:cTn>
+                                        <p:tgtEl>
+                                          <p:spTgt spid="12"/>
+                                        </p:tgtEl>
+                                        <p:attrNameLst>
+                                          <p:attrName>style.visibility</p:attrName>
+                                        </p:attrNameLst>
+                                      </p:cBhvr>
+                                      <p:to>
+                                        <p:strVal val="visible"/>
+                                      </p:to>
+                                    </p:set>
+                                    <p:animEffect transition="in" filter="fade">
+                                      <p:cBhvr>
+                                        <p:cTn id="35" dur="500"/>
+                                        <p:tgtEl>
+                                          <p:spTgt spid="12"/>
+                                        </p:tgtEl>
+                                      </p:cBhvr>
+                                    </p:animEffect>
+                                  </p:childTnLst>
+                                  <p:subTnLst>
+                                    <p:set>
+                                      <p:cBhvr override="childStyle">
+                                        <p:cTn dur="1" fill="hold" display="0" masterRel="nextClick" afterEffect="1"/>
+                                        <p:tgtEl>
+                                          <p:spTgt spid="12"/>
+                                        </p:tgtEl>
+                                        <p:attrNameLst>
+                                          <p:attrName>style.visibility</p:attrName>
+                                        </p:attrNameLst>
+                                      </p:cBhvr>
+                                      <p:to>
+                                        <p:strVal val="hidden"/>
+                                      </p:to>
+                                    </p:set>
+                                  </p:subTnLst>
+                                </p:cTn>
+                              </p:par>
+                              <p:par>
+                                <p:cTn id="36" presetID="10" presetClass="entr" presetSubtype="0" fill="hold" nodeType="withEffect">
+                                  <p:stCondLst>
+                                    <p:cond delay="0"/>
+                                  </p:stCondLst>
+                                  <p:childTnLst>
+                                    <p:set>
+                                      <p:cBhvr>
+                                        <p:cTn id="37" dur="1" fill="hold">
+                                          <p:stCondLst>
+                                            <p:cond delay="0"/>
+                                          </p:stCondLst>
+                                        </p:cTn>
+                                        <p:tgtEl>
+                                          <p:spTgt spid="7"/>
+                                        </p:tgtEl>
+                                        <p:attrNameLst>
+                                          <p:attrName>style.visibility</p:attrName>
+                                        </p:attrNameLst>
+                                      </p:cBhvr>
+                                      <p:to>
+                                        <p:strVal val="visible"/>
+                                      </p:to>
+                                    </p:set>
+                                    <p:animEffect transition="in" filter="fade">
+                                      <p:cBhvr>
+                                        <p:cTn id="38" dur="500"/>
+                                        <p:tgtEl>
+                                          <p:spTgt spid="7"/>
+                                        </p:tgtEl>
+                                      </p:cBhvr>
+                                    </p:animEffect>
+                                  </p:childTnLst>
+                                  <p:subTnLst>
+                                    <p:set>
+                                      <p:cBhvr override="childStyle">
+                                        <p:cTn dur="1" fill="hold" display="0" masterRel="nextClick" afterEffect="1"/>
+                                        <p:tgtEl>
+                                          <p:spTgt spid="7"/>
+                                        </p:tgtEl>
+                                        <p:attrNameLst>
+                                          <p:attrName>style.visibility</p:attrName>
+                                        </p:attrNameLst>
+                                      </p:cBhvr>
+                                      <p:to>
+                                        <p:strVal val="hidden"/>
+                                      </p:to>
+                                    </p:set>
+                                  </p:subTnLst>
+                                </p:cTn>
+                              </p:par>
+                              <p:par>
+                                <p:cTn id="39" presetID="10" presetClass="entr" presetSubtype="0" fill="hold" grpId="0" nodeType="withEffect">
+                                  <p:stCondLst>
+                                    <p:cond delay="0"/>
+                                  </p:stCondLst>
+                                  <p:childTnLst>
+                                    <p:set>
+                                      <p:cBhvr>
+                                        <p:cTn id="40" dur="1" fill="hold">
+                                          <p:stCondLst>
+                                            <p:cond delay="0"/>
+                                          </p:stCondLst>
+                                        </p:cTn>
+                                        <p:tgtEl>
+                                          <p:spTgt spid="5"/>
+                                        </p:tgtEl>
+                                        <p:attrNameLst>
+                                          <p:attrName>style.visibility</p:attrName>
+                                        </p:attrNameLst>
+                                      </p:cBhvr>
+                                      <p:to>
+                                        <p:strVal val="visible"/>
+                                      </p:to>
+                                    </p:set>
+                                    <p:animEffect transition="in" filter="fade">
+                                      <p:cBhvr>
+                                        <p:cTn id="41" dur="500"/>
+                                        <p:tgtEl>
+                                          <p:spTgt spid="5"/>
+                                        </p:tgtEl>
+                                      </p:cBhvr>
+                                    </p:animEffect>
+                                  </p:childTnLst>
+                                  <p:subTnLst>
+                                    <p:set>
+                                      <p:cBhvr override="childStyle">
+                                        <p:cTn dur="1" fill="hold" display="0" masterRel="nextClick" afterEffect="1"/>
+                                        <p:tgtEl>
+                                          <p:spTgt spid="5"/>
+                                        </p:tgtEl>
+                                        <p:attrNameLst>
+                                          <p:attrName>style.visibility</p:attrName>
+                                        </p:attrNameLst>
+                                      </p:cBhvr>
+                                      <p:to>
+                                        <p:strVal val="hidden"/>
+                                      </p:to>
+                                    </p:set>
+                                  </p:subTnLst>
+                                </p:cTn>
+                              </p:par>
+                              <p:par>
+                                <p:cTn id="42" presetID="10" presetClass="entr" presetSubtype="0" fill="hold" grpId="0" nodeType="withEffect">
+                                  <p:stCondLst>
+                                    <p:cond delay="0"/>
+                                  </p:stCondLst>
+                                  <p:childTnLst>
+                                    <p:set>
+                                      <p:cBhvr>
+                                        <p:cTn id="43" dur="1" fill="hold">
+                                          <p:stCondLst>
+                                            <p:cond delay="0"/>
+                                          </p:stCondLst>
+                                        </p:cTn>
+                                        <p:tgtEl>
+                                          <p:spTgt spid="50"/>
+                                        </p:tgtEl>
+                                        <p:attrNameLst>
+                                          <p:attrName>style.visibility</p:attrName>
+                                        </p:attrNameLst>
+                                      </p:cBhvr>
+                                      <p:to>
+                                        <p:strVal val="visible"/>
+                                      </p:to>
+                                    </p:set>
+                                    <p:animEffect transition="in" filter="fade">
+                                      <p:cBhvr>
+                                        <p:cTn id="44" dur="500"/>
+                                        <p:tgtEl>
+                                          <p:spTgt spid="50"/>
+                                        </p:tgtEl>
+                                      </p:cBhvr>
+                                    </p:animEffect>
+                                  </p:childTnLst>
+                                  <p:subTnLst>
+                                    <p:set>
+                                      <p:cBhvr override="childStyle">
+                                        <p:cTn dur="1" fill="hold" display="0" masterRel="nextClick" afterEffect="1"/>
+                                        <p:tgtEl>
+                                          <p:spTgt spid="50"/>
+                                        </p:tgtEl>
+                                        <p:attrNameLst>
+                                          <p:attrName>style.visibility</p:attrName>
+                                        </p:attrNameLst>
+                                      </p:cBhvr>
+                                      <p:to>
+                                        <p:strVal val="hidden"/>
+                                      </p:to>
+                                    </p:set>
+                                  </p:subTnLst>
+                                </p:cTn>
+                              </p:par>
+                              <p:par>
+                                <p:cTn id="45" presetID="10" presetClass="entr" presetSubtype="0" fill="hold" nodeType="withEffect">
+                                  <p:stCondLst>
+                                    <p:cond delay="0"/>
+                                  </p:stCondLst>
+                                  <p:childTnLst>
+                                    <p:set>
+                                      <p:cBhvr>
+                                        <p:cTn id="46" dur="1" fill="hold">
+                                          <p:stCondLst>
+                                            <p:cond delay="0"/>
+                                          </p:stCondLst>
+                                        </p:cTn>
+                                        <p:tgtEl>
+                                          <p:spTgt spid="45"/>
+                                        </p:tgtEl>
+                                        <p:attrNameLst>
+                                          <p:attrName>style.visibility</p:attrName>
+                                        </p:attrNameLst>
+                                      </p:cBhvr>
+                                      <p:to>
+                                        <p:strVal val="visible"/>
+                                      </p:to>
+                                    </p:set>
+                                    <p:animEffect transition="in" filter="fade">
+                                      <p:cBhvr>
+                                        <p:cTn id="47" dur="500"/>
+                                        <p:tgtEl>
+                                          <p:spTgt spid="45"/>
+                                        </p:tgtEl>
+                                      </p:cBhvr>
+                                    </p:animEffect>
+                                  </p:childTnLst>
+                                  <p:subTnLst>
+                                    <p:set>
+                                      <p:cBhvr override="childStyle">
+                                        <p:cTn dur="1" fill="hold" display="0" masterRel="nextClick" afterEffect="1"/>
+                                        <p:tgtEl>
+                                          <p:spTgt spid="45"/>
+                                        </p:tgtEl>
+                                        <p:attrNameLst>
+                                          <p:attrName>style.visibility</p:attrName>
+                                        </p:attrNameLst>
+                                      </p:cBhvr>
+                                      <p:to>
+                                        <p:strVal val="hidden"/>
+                                      </p:to>
+                                    </p:set>
+                                  </p:subTnLst>
+                                </p:cTn>
+                              </p:par>
+                              <p:par>
+                                <p:cTn id="48" presetID="10" presetClass="entr" presetSubtype="0" fill="hold" grpId="0" nodeType="withEffect">
+                                  <p:stCondLst>
+                                    <p:cond delay="0"/>
+                                  </p:stCondLst>
+                                  <p:childTnLst>
+                                    <p:set>
+                                      <p:cBhvr>
+                                        <p:cTn id="49" dur="1" fill="hold">
+                                          <p:stCondLst>
+                                            <p:cond delay="0"/>
+                                          </p:stCondLst>
+                                        </p:cTn>
+                                        <p:tgtEl>
+                                          <p:spTgt spid="90"/>
+                                        </p:tgtEl>
+                                        <p:attrNameLst>
+                                          <p:attrName>style.visibility</p:attrName>
+                                        </p:attrNameLst>
+                                      </p:cBhvr>
+                                      <p:to>
+                                        <p:strVal val="visible"/>
+                                      </p:to>
+                                    </p:set>
+                                    <p:animEffect transition="in" filter="fade">
+                                      <p:cBhvr>
+                                        <p:cTn id="50" dur="500"/>
+                                        <p:tgtEl>
+                                          <p:spTgt spid="90"/>
+                                        </p:tgtEl>
+                                      </p:cBhvr>
+                                    </p:animEffect>
+                                  </p:childTnLst>
+                                  <p:subTnLst>
+                                    <p:set>
+                                      <p:cBhvr override="childStyle">
+                                        <p:cTn dur="1" fill="hold" display="0" masterRel="nextClick" afterEffect="1"/>
+                                        <p:tgtEl>
+                                          <p:spTgt spid="90"/>
+                                        </p:tgtEl>
+                                        <p:attrNameLst>
+                                          <p:attrName>style.visibility</p:attrName>
+                                        </p:attrNameLst>
+                                      </p:cBhvr>
+                                      <p:to>
+                                        <p:strVal val="hidden"/>
+                                      </p:to>
+                                    </p:set>
+                                  </p:subTnLst>
+                                </p:cTn>
+                              </p:par>
+                              <p:par>
+                                <p:cTn id="51" presetID="10" presetClass="entr" presetSubtype="0" fill="hold" nodeType="withEffect">
+                                  <p:stCondLst>
+                                    <p:cond delay="0"/>
+                                  </p:stCondLst>
+                                  <p:childTnLst>
+                                    <p:set>
+                                      <p:cBhvr>
+                                        <p:cTn id="52" dur="1" fill="hold">
+                                          <p:stCondLst>
+                                            <p:cond delay="0"/>
+                                          </p:stCondLst>
+                                        </p:cTn>
+                                        <p:tgtEl>
+                                          <p:spTgt spid="8"/>
+                                        </p:tgtEl>
+                                        <p:attrNameLst>
+                                          <p:attrName>style.visibility</p:attrName>
+                                        </p:attrNameLst>
+                                      </p:cBhvr>
+                                      <p:to>
+                                        <p:strVal val="visible"/>
+                                      </p:to>
+                                    </p:set>
+                                    <p:animEffect transition="in" filter="fade">
+                                      <p:cBhvr>
+                                        <p:cTn id="53" dur="500"/>
+                                        <p:tgtEl>
+                                          <p:spTgt spid="8"/>
+                                        </p:tgtEl>
+                                      </p:cBhvr>
+                                    </p:animEffect>
+                                  </p:childTnLst>
+                                  <p:subTnLst>
+                                    <p:set>
+                                      <p:cBhvr override="childStyle">
+                                        <p:cTn dur="1" fill="hold" display="0" masterRel="nextClick" afterEffect="1"/>
+                                        <p:tgtEl>
+                                          <p:spTgt spid="8"/>
+                                        </p:tgtEl>
+                                        <p:attrNameLst>
+                                          <p:attrName>style.visibility</p:attrName>
+                                        </p:attrNameLst>
+                                      </p:cBhvr>
+                                      <p:to>
+                                        <p:strVal val="hidden"/>
+                                      </p:to>
+                                    </p:set>
+                                  </p:subTnLst>
+                                </p:cTn>
+                              </p:par>
+                            </p:childTnLst>
+                          </p:cTn>
+                        </p:par>
+                      </p:childTnLst>
+                    </p:cTn>
+                  </p:par>
+                  <p:par>
+                    <p:cTn id="54" fill="hold">
+                      <p:stCondLst>
+                        <p:cond delay="indefinite"/>
+                      </p:stCondLst>
+                      <p:childTnLst>
+                        <p:par>
+                          <p:cTn id="55" fill="hold">
+                            <p:stCondLst>
+                              <p:cond delay="0"/>
+                            </p:stCondLst>
+                            <p:childTnLst>
+                              <p:par>
+                                <p:cTn id="56" presetID="10" presetClass="entr" presetSubtype="0" fill="hold" grpId="0" nodeType="clickEffect">
+                                  <p:stCondLst>
+                                    <p:cond delay="0"/>
+                                  </p:stCondLst>
+                                  <p:childTnLst>
+                                    <p:set>
+                                      <p:cBhvr>
+                                        <p:cTn id="57" dur="1" fill="hold">
+                                          <p:stCondLst>
+                                            <p:cond delay="0"/>
+                                          </p:stCondLst>
+                                        </p:cTn>
+                                        <p:tgtEl>
+                                          <p:spTgt spid="101"/>
+                                        </p:tgtEl>
+                                        <p:attrNameLst>
+                                          <p:attrName>style.visibility</p:attrName>
+                                        </p:attrNameLst>
+                                      </p:cBhvr>
+                                      <p:to>
+                                        <p:strVal val="visible"/>
+                                      </p:to>
+                                    </p:set>
+                                    <p:animEffect transition="in" filter="fade">
+                                      <p:cBhvr>
+                                        <p:cTn id="58" dur="500"/>
+                                        <p:tgtEl>
+                                          <p:spTgt spid="101"/>
+                                        </p:tgtEl>
+                                      </p:cBhvr>
+                                    </p:animEffect>
+                                  </p:childTnLst>
+                                  <p:subTnLst>
+                                    <p:set>
+                                      <p:cBhvr override="childStyle">
+                                        <p:cTn dur="1" fill="hold" display="0" masterRel="nextClick" afterEffect="1"/>
+                                        <p:tgtEl>
+                                          <p:spTgt spid="101"/>
+                                        </p:tgtEl>
+                                        <p:attrNameLst>
+                                          <p:attrName>style.visibility</p:attrName>
+                                        </p:attrNameLst>
+                                      </p:cBhvr>
+                                      <p:to>
+                                        <p:strVal val="hidden"/>
+                                      </p:to>
+                                    </p:set>
+                                  </p:subTnLst>
+                                </p:cTn>
+                              </p:par>
+                              <p:par>
+                                <p:cTn id="59" presetID="10" presetClass="entr" presetSubtype="0" fill="hold" grpId="0" nodeType="withEffect">
+                                  <p:stCondLst>
+                                    <p:cond delay="0"/>
+                                  </p:stCondLst>
+                                  <p:childTnLst>
+                                    <p:set>
+                                      <p:cBhvr>
+                                        <p:cTn id="60" dur="1" fill="hold">
+                                          <p:stCondLst>
+                                            <p:cond delay="0"/>
+                                          </p:stCondLst>
+                                        </p:cTn>
+                                        <p:tgtEl>
+                                          <p:spTgt spid="106"/>
+                                        </p:tgtEl>
+                                        <p:attrNameLst>
+                                          <p:attrName>style.visibility</p:attrName>
+                                        </p:attrNameLst>
+                                      </p:cBhvr>
+                                      <p:to>
+                                        <p:strVal val="visible"/>
+                                      </p:to>
+                                    </p:set>
+                                    <p:animEffect transition="in" filter="fade">
+                                      <p:cBhvr>
+                                        <p:cTn id="61" dur="500"/>
+                                        <p:tgtEl>
+                                          <p:spTgt spid="106"/>
+                                        </p:tgtEl>
+                                      </p:cBhvr>
+                                    </p:animEffect>
+                                  </p:childTnLst>
+                                  <p:subTnLst>
+                                    <p:set>
+                                      <p:cBhvr override="childStyle">
+                                        <p:cTn dur="1" fill="hold" display="0" masterRel="nextClick" afterEffect="1"/>
+                                        <p:tgtEl>
+                                          <p:spTgt spid="106"/>
+                                        </p:tgtEl>
+                                        <p:attrNameLst>
+                                          <p:attrName>style.visibility</p:attrName>
+                                        </p:attrNameLst>
+                                      </p:cBhvr>
+                                      <p:to>
+                                        <p:strVal val="hidden"/>
+                                      </p:to>
+                                    </p:set>
+                                  </p:subTnLst>
+                                </p:cTn>
+                              </p:par>
+                              <p:par>
+                                <p:cTn id="62" presetID="10" presetClass="entr" presetSubtype="0" fill="hold" nodeType="withEffect">
+                                  <p:stCondLst>
+                                    <p:cond delay="0"/>
+                                  </p:stCondLst>
+                                  <p:childTnLst>
+                                    <p:set>
+                                      <p:cBhvr>
+                                        <p:cTn id="63" dur="1" fill="hold">
+                                          <p:stCondLst>
+                                            <p:cond delay="0"/>
+                                          </p:stCondLst>
+                                        </p:cTn>
+                                        <p:tgtEl>
+                                          <p:spTgt spid="39"/>
+                                        </p:tgtEl>
+                                        <p:attrNameLst>
+                                          <p:attrName>style.visibility</p:attrName>
+                                        </p:attrNameLst>
+                                      </p:cBhvr>
+                                      <p:to>
+                                        <p:strVal val="visible"/>
+                                      </p:to>
+                                    </p:set>
+                                    <p:animEffect transition="in" filter="fade">
+                                      <p:cBhvr>
+                                        <p:cTn id="64" dur="500"/>
+                                        <p:tgtEl>
+                                          <p:spTgt spid="39"/>
+                                        </p:tgtEl>
+                                      </p:cBhvr>
+                                    </p:animEffect>
+                                  </p:childTnLst>
+                                  <p:subTnLst>
+                                    <p:set>
+                                      <p:cBhvr override="childStyle">
+                                        <p:cTn dur="1" fill="hold" display="0" masterRel="nextClick" afterEffect="1"/>
+                                        <p:tgtEl>
+                                          <p:spTgt spid="39"/>
+                                        </p:tgtEl>
+                                        <p:attrNameLst>
+                                          <p:attrName>style.visibility</p:attrName>
+                                        </p:attrNameLst>
+                                      </p:cBhvr>
+                                      <p:to>
+                                        <p:strVal val="hidden"/>
+                                      </p:to>
+                                    </p:set>
+                                  </p:subTnLst>
+                                </p:cTn>
+                              </p:par>
+                            </p:childTnLst>
+                          </p:cTn>
+                        </p:par>
+                      </p:childTnLst>
+                    </p:cTn>
+                  </p:par>
+                  <p:par>
+                    <p:cTn id="65" fill="hold">
+                      <p:stCondLst>
+                        <p:cond delay="indefinite"/>
+                      </p:stCondLst>
+                      <p:childTnLst>
+                        <p:par>
+                          <p:cTn id="66" fill="hold">
+                            <p:stCondLst>
+                              <p:cond delay="0"/>
+                            </p:stCondLst>
+                            <p:childTnLst>
+                              <p:par>
+                                <p:cTn id="67" presetID="10" presetClass="entr" presetSubtype="0" fill="hold" grpId="0" nodeType="clickEffect">
+                                  <p:stCondLst>
+                                    <p:cond delay="0"/>
+                                  </p:stCondLst>
+                                  <p:childTnLst>
+                                    <p:set>
+                                      <p:cBhvr>
+                                        <p:cTn id="68" dur="1" fill="hold">
+                                          <p:stCondLst>
+                                            <p:cond delay="0"/>
+                                          </p:stCondLst>
+                                        </p:cTn>
+                                        <p:tgtEl>
+                                          <p:spTgt spid="82"/>
+                                        </p:tgtEl>
+                                        <p:attrNameLst>
+                                          <p:attrName>style.visibility</p:attrName>
+                                        </p:attrNameLst>
+                                      </p:cBhvr>
+                                      <p:to>
+                                        <p:strVal val="visible"/>
+                                      </p:to>
+                                    </p:set>
+                                    <p:animEffect transition="in" filter="fade">
+                                      <p:cBhvr>
+                                        <p:cTn id="69" dur="500"/>
+                                        <p:tgtEl>
+                                          <p:spTgt spid="82"/>
+                                        </p:tgtEl>
+                                      </p:cBhvr>
+                                    </p:animEffect>
+                                  </p:childTnLst>
+                                  <p:subTnLst>
+                                    <p:set>
+                                      <p:cBhvr override="childStyle">
+                                        <p:cTn dur="1" fill="hold" display="0" masterRel="nextClick" afterEffect="1"/>
+                                        <p:tgtEl>
+                                          <p:spTgt spid="82"/>
+                                        </p:tgtEl>
+                                        <p:attrNameLst>
+                                          <p:attrName>style.visibility</p:attrName>
+                                        </p:attrNameLst>
+                                      </p:cBhvr>
+                                      <p:to>
+                                        <p:strVal val="hidden"/>
+                                      </p:to>
+                                    </p:set>
+                                  </p:subTnLst>
+                                </p:cTn>
+                              </p:par>
+                              <p:par>
+                                <p:cTn id="70" presetID="10" presetClass="entr" presetSubtype="0" fill="hold" nodeType="withEffect">
+                                  <p:stCondLst>
+                                    <p:cond delay="0"/>
+                                  </p:stCondLst>
+                                  <p:childTnLst>
+                                    <p:set>
+                                      <p:cBhvr>
+                                        <p:cTn id="71" dur="1" fill="hold">
+                                          <p:stCondLst>
+                                            <p:cond delay="0"/>
+                                          </p:stCondLst>
+                                        </p:cTn>
+                                        <p:tgtEl>
+                                          <p:spTgt spid="85"/>
+                                        </p:tgtEl>
+                                        <p:attrNameLst>
+                                          <p:attrName>style.visibility</p:attrName>
+                                        </p:attrNameLst>
+                                      </p:cBhvr>
+                                      <p:to>
+                                        <p:strVal val="visible"/>
+                                      </p:to>
+                                    </p:set>
+                                    <p:animEffect transition="in" filter="fade">
+                                      <p:cBhvr>
+                                        <p:cTn id="72" dur="500"/>
+                                        <p:tgtEl>
+                                          <p:spTgt spid="85"/>
+                                        </p:tgtEl>
+                                      </p:cBhvr>
+                                    </p:animEffect>
+                                  </p:childTnLst>
+                                  <p:subTnLst>
+                                    <p:set>
+                                      <p:cBhvr override="childStyle">
+                                        <p:cTn dur="1" fill="hold" display="0" masterRel="nextClick" afterEffect="1"/>
+                                        <p:tgtEl>
+                                          <p:spTgt spid="85"/>
+                                        </p:tgtEl>
+                                        <p:attrNameLst>
+                                          <p:attrName>style.visibility</p:attrName>
+                                        </p:attrNameLst>
+                                      </p:cBhvr>
+                                      <p:to>
+                                        <p:strVal val="hidden"/>
+                                      </p:to>
+                                    </p:set>
+                                  </p:subTnLst>
+                                </p:cTn>
+                              </p:par>
+                              <p:par>
+                                <p:cTn id="73" presetID="10" presetClass="entr" presetSubtype="0" fill="hold" grpId="0" nodeType="withEffect">
+                                  <p:stCondLst>
+                                    <p:cond delay="0"/>
+                                  </p:stCondLst>
+                                  <p:childTnLst>
+                                    <p:set>
+                                      <p:cBhvr>
+                                        <p:cTn id="74" dur="1" fill="hold">
+                                          <p:stCondLst>
+                                            <p:cond delay="0"/>
+                                          </p:stCondLst>
+                                        </p:cTn>
+                                        <p:tgtEl>
+                                          <p:spTgt spid="81"/>
+                                        </p:tgtEl>
+                                        <p:attrNameLst>
+                                          <p:attrName>style.visibility</p:attrName>
+                                        </p:attrNameLst>
+                                      </p:cBhvr>
+                                      <p:to>
+                                        <p:strVal val="visible"/>
+                                      </p:to>
+                                    </p:set>
+                                    <p:animEffect transition="in" filter="fade">
+                                      <p:cBhvr>
+                                        <p:cTn id="75" dur="500"/>
+                                        <p:tgtEl>
+                                          <p:spTgt spid="81"/>
+                                        </p:tgtEl>
+                                      </p:cBhvr>
+                                    </p:animEffect>
+                                  </p:childTnLst>
+                                  <p:subTnLst>
+                                    <p:set>
+                                      <p:cBhvr override="childStyle">
+                                        <p:cTn dur="1" fill="hold" display="0" masterRel="nextClick" afterEffect="1"/>
+                                        <p:tgtEl>
+                                          <p:spTgt spid="81"/>
+                                        </p:tgtEl>
+                                        <p:attrNameLst>
+                                          <p:attrName>style.visibility</p:attrName>
+                                        </p:attrNameLst>
+                                      </p:cBhvr>
+                                      <p:to>
+                                        <p:strVal val="hidden"/>
+                                      </p:to>
+                                    </p:set>
+                                  </p:subTnLst>
+                                </p:cTn>
+                              </p:par>
+                            </p:childTnLst>
+                          </p:cTn>
+                        </p:par>
+                      </p:childTnLst>
+                    </p:cTn>
+                  </p:par>
+                  <p:par>
+                    <p:cTn id="76" fill="hold">
+                      <p:stCondLst>
+                        <p:cond delay="indefinite"/>
+                      </p:stCondLst>
+                      <p:childTnLst>
+                        <p:par>
+                          <p:cTn id="77" fill="hold">
+                            <p:stCondLst>
+                              <p:cond delay="0"/>
+                            </p:stCondLst>
+                            <p:childTnLst>
+                              <p:par>
+                                <p:cTn id="78" presetID="10" presetClass="entr" presetSubtype="0" fill="hold" grpId="0" nodeType="clickEffect">
+                                  <p:stCondLst>
+                                    <p:cond delay="0"/>
+                                  </p:stCondLst>
+                                  <p:childTnLst>
+                                    <p:set>
+                                      <p:cBhvr>
+                                        <p:cTn id="79" dur="1" fill="hold">
+                                          <p:stCondLst>
+                                            <p:cond delay="0"/>
+                                          </p:stCondLst>
+                                        </p:cTn>
+                                        <p:tgtEl>
+                                          <p:spTgt spid="52"/>
+                                        </p:tgtEl>
+                                        <p:attrNameLst>
+                                          <p:attrName>style.visibility</p:attrName>
+                                        </p:attrNameLst>
+                                      </p:cBhvr>
+                                      <p:to>
+                                        <p:strVal val="visible"/>
+                                      </p:to>
+                                    </p:set>
+                                    <p:animEffect transition="in" filter="fade">
+                                      <p:cBhvr>
+                                        <p:cTn id="80" dur="500"/>
+                                        <p:tgtEl>
+                                          <p:spTgt spid="52"/>
+                                        </p:tgtEl>
+                                      </p:cBhvr>
+                                    </p:animEffect>
+                                  </p:childTnLst>
+                                  <p:subTnLst>
+                                    <p:set>
+                                      <p:cBhvr override="childStyle">
+                                        <p:cTn dur="1" fill="hold" display="0" masterRel="nextClick" afterEffect="1"/>
+                                        <p:tgtEl>
+                                          <p:spTgt spid="52"/>
+                                        </p:tgtEl>
+                                        <p:attrNameLst>
+                                          <p:attrName>style.visibility</p:attrName>
+                                        </p:attrNameLst>
+                                      </p:cBhvr>
+                                      <p:to>
+                                        <p:strVal val="hidden"/>
+                                      </p:to>
+                                    </p:set>
+                                  </p:subTnLst>
+                                </p:cTn>
+                              </p:par>
+                              <p:par>
+                                <p:cTn id="81" presetID="10" presetClass="entr" presetSubtype="0" fill="hold" nodeType="withEffect">
+                                  <p:stCondLst>
+                                    <p:cond delay="0"/>
+                                  </p:stCondLst>
+                                  <p:childTnLst>
+                                    <p:set>
+                                      <p:cBhvr>
+                                        <p:cTn id="82" dur="1" fill="hold">
+                                          <p:stCondLst>
+                                            <p:cond delay="0"/>
+                                          </p:stCondLst>
+                                        </p:cTn>
+                                        <p:tgtEl>
+                                          <p:spTgt spid="53"/>
+                                        </p:tgtEl>
+                                        <p:attrNameLst>
+                                          <p:attrName>style.visibility</p:attrName>
+                                        </p:attrNameLst>
+                                      </p:cBhvr>
+                                      <p:to>
+                                        <p:strVal val="visible"/>
+                                      </p:to>
+                                    </p:set>
+                                    <p:animEffect transition="in" filter="fade">
+                                      <p:cBhvr>
+                                        <p:cTn id="83" dur="500"/>
+                                        <p:tgtEl>
+                                          <p:spTgt spid="53"/>
+                                        </p:tgtEl>
+                                      </p:cBhvr>
+                                    </p:animEffect>
+                                  </p:childTnLst>
+                                  <p:subTnLst>
+                                    <p:set>
+                                      <p:cBhvr override="childStyle">
+                                        <p:cTn dur="1" fill="hold" display="0" masterRel="nextClick" afterEffect="1"/>
+                                        <p:tgtEl>
+                                          <p:spTgt spid="53"/>
+                                        </p:tgtEl>
+                                        <p:attrNameLst>
+                                          <p:attrName>style.visibility</p:attrName>
+                                        </p:attrNameLst>
+                                      </p:cBhvr>
+                                      <p:to>
+                                        <p:strVal val="hidden"/>
+                                      </p:to>
+                                    </p:set>
+                                  </p:subTnLst>
+                                </p:cTn>
+                              </p:par>
+                              <p:par>
+                                <p:cTn id="84" presetID="10" presetClass="entr" presetSubtype="0" fill="hold" nodeType="withEffect">
+                                  <p:stCondLst>
+                                    <p:cond delay="0"/>
+                                  </p:stCondLst>
+                                  <p:childTnLst>
+                                    <p:set>
+                                      <p:cBhvr>
+                                        <p:cTn id="85" dur="1" fill="hold">
+                                          <p:stCondLst>
+                                            <p:cond delay="0"/>
+                                          </p:stCondLst>
+                                        </p:cTn>
+                                        <p:tgtEl>
+                                          <p:spTgt spid="65"/>
+                                        </p:tgtEl>
+                                        <p:attrNameLst>
+                                          <p:attrName>style.visibility</p:attrName>
+                                        </p:attrNameLst>
+                                      </p:cBhvr>
+                                      <p:to>
+                                        <p:strVal val="visible"/>
+                                      </p:to>
+                                    </p:set>
+                                    <p:animEffect transition="in" filter="fade">
+                                      <p:cBhvr>
+                                        <p:cTn id="86" dur="500"/>
+                                        <p:tgtEl>
+                                          <p:spTgt spid="65"/>
+                                        </p:tgtEl>
+                                      </p:cBhvr>
+                                    </p:animEffect>
+                                  </p:childTnLst>
+                                  <p:subTnLst>
+                                    <p:set>
+                                      <p:cBhvr override="childStyle">
+                                        <p:cTn dur="1" fill="hold" display="0" masterRel="nextClick" afterEffect="1"/>
+                                        <p:tgtEl>
+                                          <p:spTgt spid="65"/>
+                                        </p:tgtEl>
+                                        <p:attrNameLst>
+                                          <p:attrName>style.visibility</p:attrName>
+                                        </p:attrNameLst>
+                                      </p:cBhvr>
+                                      <p:to>
+                                        <p:strVal val="hidden"/>
+                                      </p:to>
+                                    </p:set>
+                                  </p:subTnLst>
+                                </p:cTn>
+                              </p:par>
+                              <p:par>
+                                <p:cTn id="87" presetID="10" presetClass="entr" presetSubtype="0" fill="hold" grpId="0" nodeType="withEffect">
+                                  <p:stCondLst>
+                                    <p:cond delay="0"/>
+                                  </p:stCondLst>
+                                  <p:childTnLst>
+                                    <p:set>
+                                      <p:cBhvr>
+                                        <p:cTn id="88" dur="1" fill="hold">
+                                          <p:stCondLst>
+                                            <p:cond delay="0"/>
+                                          </p:stCondLst>
+                                        </p:cTn>
+                                        <p:tgtEl>
+                                          <p:spTgt spid="60"/>
+                                        </p:tgtEl>
+                                        <p:attrNameLst>
+                                          <p:attrName>style.visibility</p:attrName>
+                                        </p:attrNameLst>
+                                      </p:cBhvr>
+                                      <p:to>
+                                        <p:strVal val="visible"/>
+                                      </p:to>
+                                    </p:set>
+                                    <p:animEffect transition="in" filter="fade">
+                                      <p:cBhvr>
+                                        <p:cTn id="89" dur="500"/>
+                                        <p:tgtEl>
+                                          <p:spTgt spid="60"/>
+                                        </p:tgtEl>
+                                      </p:cBhvr>
+                                    </p:animEffect>
+                                  </p:childTnLst>
+                                  <p:subTnLst>
+                                    <p:set>
+                                      <p:cBhvr override="childStyle">
+                                        <p:cTn dur="1" fill="hold" display="0" masterRel="nextClick" afterEffect="1"/>
+                                        <p:tgtEl>
+                                          <p:spTgt spid="60"/>
+                                        </p:tgtEl>
+                                        <p:attrNameLst>
+                                          <p:attrName>style.visibility</p:attrName>
+                                        </p:attrNameLst>
+                                      </p:cBhvr>
+                                      <p:to>
+                                        <p:strVal val="hidden"/>
+                                      </p:to>
+                                    </p:set>
+                                  </p:subTnLst>
+                                </p:cTn>
+                              </p:par>
+                              <p:par>
+                                <p:cTn id="90" presetID="10" presetClass="entr" presetSubtype="0" fill="hold" nodeType="withEffect">
+                                  <p:stCondLst>
+                                    <p:cond delay="0"/>
+                                  </p:stCondLst>
+                                  <p:childTnLst>
+                                    <p:set>
+                                      <p:cBhvr>
+                                        <p:cTn id="91" dur="1" fill="hold">
+                                          <p:stCondLst>
+                                            <p:cond delay="0"/>
+                                          </p:stCondLst>
+                                        </p:cTn>
+                                        <p:tgtEl>
+                                          <p:spTgt spid="71"/>
+                                        </p:tgtEl>
+                                        <p:attrNameLst>
+                                          <p:attrName>style.visibility</p:attrName>
+                                        </p:attrNameLst>
+                                      </p:cBhvr>
+                                      <p:to>
+                                        <p:strVal val="visible"/>
+                                      </p:to>
+                                    </p:set>
+                                    <p:animEffect transition="in" filter="fade">
+                                      <p:cBhvr>
+                                        <p:cTn id="92" dur="500"/>
+                                        <p:tgtEl>
+                                          <p:spTgt spid="71"/>
+                                        </p:tgtEl>
+                                      </p:cBhvr>
+                                    </p:animEffect>
+                                  </p:childTnLst>
+                                  <p:subTnLst>
+                                    <p:set>
+                                      <p:cBhvr override="childStyle">
+                                        <p:cTn dur="1" fill="hold" display="0" masterRel="nextClick" afterEffect="1"/>
+                                        <p:tgtEl>
+                                          <p:spTgt spid="71"/>
+                                        </p:tgtEl>
+                                        <p:attrNameLst>
+                                          <p:attrName>style.visibility</p:attrName>
+                                        </p:attrNameLst>
+                                      </p:cBhvr>
+                                      <p:to>
+                                        <p:strVal val="hidden"/>
+                                      </p:to>
+                                    </p:set>
+                                  </p:subTnLst>
+                                </p:cTn>
+                              </p:par>
+                              <p:par>
+                                <p:cTn id="93" presetID="10" presetClass="entr" presetSubtype="0" fill="hold" grpId="0" nodeType="withEffect">
+                                  <p:stCondLst>
+                                    <p:cond delay="0"/>
+                                  </p:stCondLst>
+                                  <p:childTnLst>
+                                    <p:set>
+                                      <p:cBhvr>
+                                        <p:cTn id="94" dur="1" fill="hold">
+                                          <p:stCondLst>
+                                            <p:cond delay="0"/>
+                                          </p:stCondLst>
+                                        </p:cTn>
+                                        <p:tgtEl>
+                                          <p:spTgt spid="61"/>
+                                        </p:tgtEl>
+                                        <p:attrNameLst>
+                                          <p:attrName>style.visibility</p:attrName>
+                                        </p:attrNameLst>
+                                      </p:cBhvr>
+                                      <p:to>
+                                        <p:strVal val="visible"/>
+                                      </p:to>
+                                    </p:set>
+                                    <p:animEffect transition="in" filter="fade">
+                                      <p:cBhvr>
+                                        <p:cTn id="95" dur="500"/>
+                                        <p:tgtEl>
+                                          <p:spTgt spid="61"/>
+                                        </p:tgtEl>
+                                      </p:cBhvr>
+                                    </p:animEffect>
+                                  </p:childTnLst>
+                                  <p:subTnLst>
+                                    <p:set>
+                                      <p:cBhvr override="childStyle">
+                                        <p:cTn dur="1" fill="hold" display="0" masterRel="nextClick" afterEffect="1"/>
+                                        <p:tgtEl>
+                                          <p:spTgt spid="61"/>
+                                        </p:tgtEl>
+                                        <p:attrNameLst>
+                                          <p:attrName>style.visibility</p:attrName>
+                                        </p:attrNameLst>
+                                      </p:cBhvr>
+                                      <p:to>
+                                        <p:strVal val="hidden"/>
+                                      </p:to>
+                                    </p:set>
+                                  </p:subTnLst>
+                                </p:cTn>
+                              </p:par>
+                              <p:par>
+                                <p:cTn id="96" presetID="10" presetClass="entr" presetSubtype="0" fill="hold" grpId="0" nodeType="withEffect">
+                                  <p:stCondLst>
+                                    <p:cond delay="0"/>
+                                  </p:stCondLst>
+                                  <p:childTnLst>
+                                    <p:set>
+                                      <p:cBhvr>
+                                        <p:cTn id="97" dur="1" fill="hold">
+                                          <p:stCondLst>
+                                            <p:cond delay="0"/>
+                                          </p:stCondLst>
+                                        </p:cTn>
+                                        <p:tgtEl>
+                                          <p:spTgt spid="70"/>
+                                        </p:tgtEl>
+                                        <p:attrNameLst>
+                                          <p:attrName>style.visibility</p:attrName>
+                                        </p:attrNameLst>
+                                      </p:cBhvr>
+                                      <p:to>
+                                        <p:strVal val="visible"/>
+                                      </p:to>
+                                    </p:set>
+                                    <p:animEffect transition="in" filter="fade">
+                                      <p:cBhvr>
+                                        <p:cTn id="98" dur="500"/>
+                                        <p:tgtEl>
+                                          <p:spTgt spid="70"/>
+                                        </p:tgtEl>
+                                      </p:cBhvr>
+                                    </p:animEffect>
+                                  </p:childTnLst>
+                                  <p:subTnLst>
+                                    <p:set>
+                                      <p:cBhvr override="childStyle">
+                                        <p:cTn dur="1" fill="hold" display="0" masterRel="nextClick" afterEffect="1"/>
+                                        <p:tgtEl>
+                                          <p:spTgt spid="70"/>
+                                        </p:tgtEl>
+                                        <p:attrNameLst>
+                                          <p:attrName>style.visibility</p:attrName>
+                                        </p:attrNameLst>
+                                      </p:cBhvr>
+                                      <p:to>
+                                        <p:strVal val="hidden"/>
+                                      </p:to>
+                                    </p:set>
+                                  </p:subTnLst>
+                                </p:cTn>
+                              </p:par>
+                              <p:par>
+                                <p:cTn id="99" presetID="10" presetClass="entr" presetSubtype="0" fill="hold" nodeType="withEffect">
+                                  <p:stCondLst>
+                                    <p:cond delay="0"/>
+                                  </p:stCondLst>
+                                  <p:childTnLst>
+                                    <p:set>
+                                      <p:cBhvr>
+                                        <p:cTn id="100" dur="1" fill="hold">
+                                          <p:stCondLst>
+                                            <p:cond delay="0"/>
+                                          </p:stCondLst>
+                                        </p:cTn>
+                                        <p:tgtEl>
+                                          <p:spTgt spid="116"/>
+                                        </p:tgtEl>
+                                        <p:attrNameLst>
+                                          <p:attrName>style.visibility</p:attrName>
+                                        </p:attrNameLst>
+                                      </p:cBhvr>
+                                      <p:to>
+                                        <p:strVal val="visible"/>
+                                      </p:to>
+                                    </p:set>
+                                    <p:animEffect transition="in" filter="fade">
+                                      <p:cBhvr>
+                                        <p:cTn id="101" dur="500"/>
+                                        <p:tgtEl>
+                                          <p:spTgt spid="116"/>
+                                        </p:tgtEl>
+                                      </p:cBhvr>
+                                    </p:animEffect>
+                                  </p:childTnLst>
+                                  <p:subTnLst>
+                                    <p:set>
+                                      <p:cBhvr override="childStyle">
+                                        <p:cTn dur="1" fill="hold" display="0" masterRel="nextClick" afterEffect="1"/>
+                                        <p:tgtEl>
+                                          <p:spTgt spid="116"/>
+                                        </p:tgtEl>
+                                        <p:attrNameLst>
+                                          <p:attrName>style.visibility</p:attrName>
+                                        </p:attrNameLst>
+                                      </p:cBhvr>
+                                      <p:to>
+                                        <p:strVal val="hidden"/>
+                                      </p:to>
+                                    </p:set>
+                                  </p:subTnLst>
+                                </p:cTn>
+                              </p:par>
+                              <p:par>
+                                <p:cTn id="102" presetID="10" presetClass="entr" presetSubtype="0" fill="hold" nodeType="withEffect">
+                                  <p:stCondLst>
+                                    <p:cond delay="0"/>
+                                  </p:stCondLst>
+                                  <p:childTnLst>
+                                    <p:set>
+                                      <p:cBhvr>
+                                        <p:cTn id="103" dur="1" fill="hold">
+                                          <p:stCondLst>
+                                            <p:cond delay="0"/>
+                                          </p:stCondLst>
+                                        </p:cTn>
+                                        <p:tgtEl>
+                                          <p:spTgt spid="108"/>
+                                        </p:tgtEl>
+                                        <p:attrNameLst>
+                                          <p:attrName>style.visibility</p:attrName>
+                                        </p:attrNameLst>
+                                      </p:cBhvr>
+                                      <p:to>
+                                        <p:strVal val="visible"/>
+                                      </p:to>
+                                    </p:set>
+                                    <p:animEffect transition="in" filter="fade">
+                                      <p:cBhvr>
+                                        <p:cTn id="104" dur="500"/>
+                                        <p:tgtEl>
+                                          <p:spTgt spid="108"/>
+                                        </p:tgtEl>
+                                      </p:cBhvr>
+                                    </p:animEffect>
+                                  </p:childTnLst>
+                                  <p:subTnLst>
+                                    <p:set>
+                                      <p:cBhvr override="childStyle">
+                                        <p:cTn dur="1" fill="hold" display="0" masterRel="nextClick" afterEffect="1"/>
+                                        <p:tgtEl>
+                                          <p:spTgt spid="108"/>
+                                        </p:tgtEl>
+                                        <p:attrNameLst>
+                                          <p:attrName>style.visibility</p:attrName>
+                                        </p:attrNameLst>
+                                      </p:cBhvr>
+                                      <p:to>
+                                        <p:strVal val="hidden"/>
+                                      </p:to>
+                                    </p:set>
+                                  </p:subTnLst>
+                                </p:cTn>
+                              </p:par>
+                              <p:par>
+                                <p:cTn id="105" presetID="10" presetClass="entr" presetSubtype="0" fill="hold" grpId="0" nodeType="withEffect">
+                                  <p:stCondLst>
+                                    <p:cond delay="0"/>
+                                  </p:stCondLst>
+                                  <p:childTnLst>
+                                    <p:set>
+                                      <p:cBhvr>
+                                        <p:cTn id="106" dur="1" fill="hold">
+                                          <p:stCondLst>
+                                            <p:cond delay="0"/>
+                                          </p:stCondLst>
+                                        </p:cTn>
+                                        <p:tgtEl>
+                                          <p:spTgt spid="102"/>
+                                        </p:tgtEl>
+                                        <p:attrNameLst>
+                                          <p:attrName>style.visibility</p:attrName>
+                                        </p:attrNameLst>
+                                      </p:cBhvr>
+                                      <p:to>
+                                        <p:strVal val="visible"/>
+                                      </p:to>
+                                    </p:set>
+                                    <p:animEffect transition="in" filter="fade">
+                                      <p:cBhvr>
+                                        <p:cTn id="107" dur="500"/>
+                                        <p:tgtEl>
+                                          <p:spTgt spid="102"/>
+                                        </p:tgtEl>
+                                      </p:cBhvr>
+                                    </p:animEffect>
+                                  </p:childTnLst>
+                                  <p:subTnLst>
+                                    <p:set>
+                                      <p:cBhvr override="childStyle">
+                                        <p:cTn dur="1" fill="hold" display="0" masterRel="nextClick" afterEffect="1"/>
+                                        <p:tgtEl>
+                                          <p:spTgt spid="102"/>
+                                        </p:tgtEl>
+                                        <p:attrNameLst>
+                                          <p:attrName>style.visibility</p:attrName>
+                                        </p:attrNameLst>
+                                      </p:cBhvr>
+                                      <p:to>
+                                        <p:strVal val="hidden"/>
+                                      </p:to>
+                                    </p:set>
+                                  </p:subTnLst>
+                                </p:cTn>
+                              </p:par>
+                              <p:par>
+                                <p:cTn id="108" presetID="10" presetClass="entr" presetSubtype="0" fill="hold" nodeType="withEffect">
+                                  <p:stCondLst>
+                                    <p:cond delay="0"/>
+                                  </p:stCondLst>
+                                  <p:childTnLst>
+                                    <p:set>
+                                      <p:cBhvr>
+                                        <p:cTn id="109" dur="1" fill="hold">
+                                          <p:stCondLst>
+                                            <p:cond delay="0"/>
+                                          </p:stCondLst>
+                                        </p:cTn>
+                                        <p:tgtEl>
+                                          <p:spTgt spid="103"/>
+                                        </p:tgtEl>
+                                        <p:attrNameLst>
+                                          <p:attrName>style.visibility</p:attrName>
+                                        </p:attrNameLst>
+                                      </p:cBhvr>
+                                      <p:to>
+                                        <p:strVal val="visible"/>
+                                      </p:to>
+                                    </p:set>
+                                    <p:animEffect transition="in" filter="fade">
+                                      <p:cBhvr>
+                                        <p:cTn id="110" dur="500"/>
+                                        <p:tgtEl>
+                                          <p:spTgt spid="103"/>
+                                        </p:tgtEl>
+                                      </p:cBhvr>
+                                    </p:animEffect>
+                                  </p:childTnLst>
+                                  <p:subTnLst>
+                                    <p:set>
+                                      <p:cBhvr override="childStyle">
+                                        <p:cTn dur="1" fill="hold" display="0" masterRel="nextClick" afterEffect="1"/>
+                                        <p:tgtEl>
+                                          <p:spTgt spid="103"/>
+                                        </p:tgtEl>
+                                        <p:attrNameLst>
+                                          <p:attrName>style.visibility</p:attrName>
+                                        </p:attrNameLst>
+                                      </p:cBhvr>
+                                      <p:to>
+                                        <p:strVal val="hidden"/>
+                                      </p:to>
+                                    </p:set>
+                                  </p:subTnLst>
+                                </p:cTn>
+                              </p:par>
+                              <p:par>
+                                <p:cTn id="111" presetID="10" presetClass="entr" presetSubtype="0" fill="hold" grpId="0" nodeType="withEffect">
+                                  <p:stCondLst>
+                                    <p:cond delay="0"/>
+                                  </p:stCondLst>
+                                  <p:childTnLst>
+                                    <p:set>
+                                      <p:cBhvr>
+                                        <p:cTn id="112" dur="1" fill="hold">
+                                          <p:stCondLst>
+                                            <p:cond delay="0"/>
+                                          </p:stCondLst>
+                                        </p:cTn>
+                                        <p:tgtEl>
+                                          <p:spTgt spid="107"/>
+                                        </p:tgtEl>
+                                        <p:attrNameLst>
+                                          <p:attrName>style.visibility</p:attrName>
+                                        </p:attrNameLst>
+                                      </p:cBhvr>
+                                      <p:to>
+                                        <p:strVal val="visible"/>
+                                      </p:to>
+                                    </p:set>
+                                    <p:animEffect transition="in" filter="fade">
+                                      <p:cBhvr>
+                                        <p:cTn id="113" dur="500"/>
+                                        <p:tgtEl>
+                                          <p:spTgt spid="107"/>
+                                        </p:tgtEl>
+                                      </p:cBhvr>
+                                    </p:animEffect>
+                                  </p:childTnLst>
+                                  <p:subTnLst>
+                                    <p:set>
+                                      <p:cBhvr override="childStyle">
+                                        <p:cTn dur="1" fill="hold" display="0" masterRel="nextClick" afterEffect="1"/>
+                                        <p:tgtEl>
+                                          <p:spTgt spid="107"/>
+                                        </p:tgtEl>
+                                        <p:attrNameLst>
+                                          <p:attrName>style.visibility</p:attrName>
+                                        </p:attrNameLst>
+                                      </p:cBhvr>
+                                      <p:to>
+                                        <p:strVal val="hidden"/>
+                                      </p:to>
+                                    </p:set>
+                                  </p:subTnLst>
+                                </p:cTn>
+                              </p:par>
+                            </p:childTnLst>
+                          </p:cTn>
+                        </p:par>
+                      </p:childTnLst>
+                    </p:cTn>
+                  </p:par>
+                </p:childTnLst>
+              </p:cTn>
+              <p:prevCondLst>
+                <p:cond evt="onPrev" delay="0">
+                  <p:tgtEl>
+                    <p:sldTgt/>
+                  </p:tgtEl>
+                </p:cond>
+              </p:prevCondLst>
+              <p:nextCondLst>
+                <p:cond evt="onNext" delay="0">
+                  <p:tgtEl>
+                    <p:sldTgt/>
+                  </p:tgtEl>
+                </p:cond>
+              </p:nextCondLst>
+            </p:seq>
+          </p:childTnLst>
+        </p:cTn>
+      </p:par>
+    </p:tnLst>
+    <p:bldLst>
+      <p:bldP spid="5" grpId="0" animBg="1"/>
+      <p:bldP spid="11" grpId="0" animBg="1"/>
+      <p:bldP spid="12" grpId="0" animBg="1"/>
+      <p:bldP spid="33" grpId="0" animBg="1"/>
+      <p:bldP spid="40" grpId="0" animBg="1"/>
+      <p:bldP spid="41" grpId="0" animBg="1"/>
+      <p:bldP spid="46" grpId="0" animBg="1"/>
+      <p:bldP spid="52" grpId="0" animBg="1"/>
+      <p:bldP spid="60" grpId="0" animBg="1"/>
+      <p:bldP spid="61" grpId="0" animBg="1"/>
+      <p:bldP spid="70" grpId="0" animBg="1"/>
+      <p:bldP spid="81" grpId="0" animBg="1"/>
+      <p:bldP spid="82" grpId="0" animBg="1"/>
+      <p:bldP spid="90" grpId="0" animBg="1"/>
+      <p:bldP spid="50" grpId="0"/>
+      <p:bldP spid="101" grpId="0" animBg="1"/>
+      <p:bldP spid="102" grpId="0" animBg="1"/>
+      <p:bldP spid="106" grpId="0" animBg="1"/>
+      <p:bldP spid="107" grpId="0" animBg="1"/>
+    </p:bldLst>
+  </p:timing>
 </p:sld>
 </file>
 

</xml_diff>